<commit_message>
add the first three examples
</commit_message>
<xml_diff>
--- a/CourseHaplet.pptx
+++ b/CourseHaplet.pptx
@@ -5,7 +5,7 @@
     <p:sldMasterId id="2147483654" r:id="rId1"/>
   </p:sldMasterIdLst>
   <p:notesMasterIdLst>
-    <p:notesMasterId r:id="rId44"/>
+    <p:notesMasterId r:id="rId54"/>
   </p:notesMasterIdLst>
   <p:sldIdLst>
     <p:sldId id="256" r:id="rId2"/>
@@ -30,26 +30,36 @@
     <p:sldId id="401" r:id="rId21"/>
     <p:sldId id="406" r:id="rId22"/>
     <p:sldId id="407" r:id="rId23"/>
-    <p:sldId id="373" r:id="rId24"/>
-    <p:sldId id="410" r:id="rId25"/>
-    <p:sldId id="411" r:id="rId26"/>
-    <p:sldId id="374" r:id="rId27"/>
-    <p:sldId id="408" r:id="rId28"/>
-    <p:sldId id="409" r:id="rId29"/>
-    <p:sldId id="375" r:id="rId30"/>
-    <p:sldId id="376" r:id="rId31"/>
-    <p:sldId id="377" r:id="rId32"/>
-    <p:sldId id="378" r:id="rId33"/>
-    <p:sldId id="379" r:id="rId34"/>
-    <p:sldId id="385" r:id="rId35"/>
-    <p:sldId id="380" r:id="rId36"/>
-    <p:sldId id="381" r:id="rId37"/>
-    <p:sldId id="384" r:id="rId38"/>
-    <p:sldId id="383" r:id="rId39"/>
-    <p:sldId id="382" r:id="rId40"/>
-    <p:sldId id="386" r:id="rId41"/>
-    <p:sldId id="387" r:id="rId42"/>
-    <p:sldId id="388" r:id="rId43"/>
+    <p:sldId id="412" r:id="rId24"/>
+    <p:sldId id="413" r:id="rId25"/>
+    <p:sldId id="373" r:id="rId26"/>
+    <p:sldId id="410" r:id="rId27"/>
+    <p:sldId id="411" r:id="rId28"/>
+    <p:sldId id="415" r:id="rId29"/>
+    <p:sldId id="374" r:id="rId30"/>
+    <p:sldId id="414" r:id="rId31"/>
+    <p:sldId id="408" r:id="rId32"/>
+    <p:sldId id="416" r:id="rId33"/>
+    <p:sldId id="375" r:id="rId34"/>
+    <p:sldId id="376" r:id="rId35"/>
+    <p:sldId id="377" r:id="rId36"/>
+    <p:sldId id="417" r:id="rId37"/>
+    <p:sldId id="418" r:id="rId38"/>
+    <p:sldId id="419" r:id="rId39"/>
+    <p:sldId id="420" r:id="rId40"/>
+    <p:sldId id="421" r:id="rId41"/>
+    <p:sldId id="422" r:id="rId42"/>
+    <p:sldId id="378" r:id="rId43"/>
+    <p:sldId id="379" r:id="rId44"/>
+    <p:sldId id="385" r:id="rId45"/>
+    <p:sldId id="380" r:id="rId46"/>
+    <p:sldId id="381" r:id="rId47"/>
+    <p:sldId id="384" r:id="rId48"/>
+    <p:sldId id="383" r:id="rId49"/>
+    <p:sldId id="382" r:id="rId50"/>
+    <p:sldId id="386" r:id="rId51"/>
+    <p:sldId id="387" r:id="rId52"/>
+    <p:sldId id="388" r:id="rId53"/>
   </p:sldIdLst>
   <p:sldSz cx="6858000" cy="5143500"/>
   <p:notesSz cx="6858000" cy="9144000"/>
@@ -5359,7 +5369,7 @@
           <a:p>
             <a:r>
               <a:rPr lang="en-US" dirty="0" smtClean="0"/>
-              <a:t>Example: Our First Program</a:t>
+              <a:t>Data </a:t>
             </a:r>
             <a:endParaRPr lang="en-US" dirty="0"/>
           </a:p>
@@ -5382,17 +5392,44 @@
           <a:p>
             <a:r>
               <a:rPr lang="en-US" dirty="0" smtClean="0"/>
-              <a:t>Step 1: Turn on the light</a:t>
+              <a:t>Bit </a:t>
             </a:r>
           </a:p>
           <a:p>
             <a:endParaRPr lang="en-US" dirty="0"/>
           </a:p>
           <a:p>
+            <a:r>
+              <a:rPr lang="en-US" dirty="0" smtClean="0"/>
+              <a:t>Nibble </a:t>
+            </a:r>
+          </a:p>
+          <a:p>
+            <a:endParaRPr lang="en-US" dirty="0"/>
+          </a:p>
+          <a:p>
+            <a:r>
+              <a:rPr lang="en-US" dirty="0" smtClean="0"/>
+              <a:t>Byte</a:t>
+            </a:r>
+          </a:p>
+          <a:p>
+            <a:endParaRPr lang="en-US" dirty="0"/>
+          </a:p>
+          <a:p>
+            <a:r>
+              <a:rPr lang="en-US" dirty="0" smtClean="0"/>
+              <a:t>Word (chomp)</a:t>
+            </a:r>
+          </a:p>
+          <a:p>
             <a:endParaRPr lang="en-US" dirty="0" smtClean="0"/>
           </a:p>
           <a:p>
-            <a:endParaRPr lang="en-US" dirty="0"/>
+            <a:r>
+              <a:rPr lang="en-US" dirty="0" smtClean="0"/>
+              <a:t>Are these specific to the machine? No this is what the 8 bit vs 16 bit vs 32 bit vs 64 bit means</a:t>
+            </a:r>
           </a:p>
         </p:txBody>
       </p:sp>
@@ -5434,6 +5471,309 @@
               <a:rPr lang="en" smtClean="0"/>
               <a:pPr/>
               <a:t>23</a:t>
+            </a:fld>
+            <a:endParaRPr lang="en"/>
+          </a:p>
+        </p:txBody>
+      </p:sp>
+    </p:spTree>
+    <p:extLst>
+      <p:ext uri="{BB962C8B-B14F-4D97-AF65-F5344CB8AC3E}">
+        <p14:creationId xmlns:p14="http://schemas.microsoft.com/office/powerpoint/2010/main" val="2419041772"/>
+      </p:ext>
+    </p:extLst>
+  </p:cSld>
+  <p:clrMapOvr>
+    <a:masterClrMapping/>
+  </p:clrMapOvr>
+</p:sld>
+</file>
+
+<file path=ppt/slides/slide24.xml><?xml version="1.0" encoding="utf-8"?>
+<p:sld xmlns:a="http://schemas.openxmlformats.org/drawingml/2006/main" xmlns:r="http://schemas.openxmlformats.org/officeDocument/2006/relationships" xmlns:p="http://schemas.openxmlformats.org/presentationml/2006/main">
+  <p:cSld>
+    <p:spTree>
+      <p:nvGrpSpPr>
+        <p:cNvPr id="1" name=""/>
+        <p:cNvGrpSpPr/>
+        <p:nvPr/>
+      </p:nvGrpSpPr>
+      <p:grpSpPr>
+        <a:xfrm>
+          <a:off x="0" y="0"/>
+          <a:ext cx="0" cy="0"/>
+          <a:chOff x="0" y="0"/>
+          <a:chExt cx="0" cy="0"/>
+        </a:xfrm>
+      </p:grpSpPr>
+      <p:sp>
+        <p:nvSpPr>
+          <p:cNvPr id="2" name="Title 1"/>
+          <p:cNvSpPr>
+            <a:spLocks noGrp="1"/>
+          </p:cNvSpPr>
+          <p:nvPr>
+            <p:ph type="title"/>
+          </p:nvPr>
+        </p:nvSpPr>
+        <p:spPr/>
+        <p:txBody>
+          <a:bodyPr/>
+          <a:lstStyle/>
+          <a:p>
+            <a:r>
+              <a:rPr lang="en-US" dirty="0" smtClean="0"/>
+              <a:t>Data Structures: </a:t>
+            </a:r>
+            <a:r>
+              <a:rPr lang="en-US" dirty="0" err="1" smtClean="0"/>
+              <a:t>Archatechture</a:t>
+            </a:r>
+            <a:endParaRPr lang="en-US" dirty="0"/>
+          </a:p>
+        </p:txBody>
+      </p:sp>
+      <p:sp>
+        <p:nvSpPr>
+          <p:cNvPr id="3" name="Text Placeholder 2"/>
+          <p:cNvSpPr>
+            <a:spLocks noGrp="1"/>
+          </p:cNvSpPr>
+          <p:nvPr>
+            <p:ph type="body" idx="1"/>
+          </p:nvPr>
+        </p:nvSpPr>
+        <p:spPr/>
+        <p:txBody>
+          <a:bodyPr/>
+          <a:lstStyle/>
+          <a:p>
+            <a:r>
+              <a:rPr lang="en-US" dirty="0" smtClean="0"/>
+              <a:t>byte</a:t>
+            </a:r>
+          </a:p>
+          <a:p>
+            <a:r>
+              <a:rPr lang="en-US" dirty="0" smtClean="0"/>
+              <a:t>char</a:t>
+            </a:r>
+            <a:endParaRPr lang="en-US" dirty="0"/>
+          </a:p>
+          <a:p>
+            <a:endParaRPr lang="en-US" dirty="0"/>
+          </a:p>
+          <a:p>
+            <a:r>
+              <a:rPr lang="en-US" dirty="0" err="1" smtClean="0"/>
+              <a:t>int</a:t>
+            </a:r>
+            <a:endParaRPr lang="en-US" dirty="0" smtClean="0"/>
+          </a:p>
+          <a:p>
+            <a:r>
+              <a:rPr lang="en-US" dirty="0" smtClean="0"/>
+              <a:t>word</a:t>
+            </a:r>
+          </a:p>
+          <a:p>
+            <a:endParaRPr lang="en-US" dirty="0"/>
+          </a:p>
+          <a:p>
+            <a:endParaRPr lang="en-US" dirty="0" smtClean="0"/>
+          </a:p>
+          <a:p>
+            <a:r>
+              <a:rPr lang="en-US" dirty="0" smtClean="0"/>
+              <a:t>uint8_t</a:t>
+            </a:r>
+          </a:p>
+          <a:p>
+            <a:r>
+              <a:rPr lang="en-US" dirty="0" smtClean="0"/>
+              <a:t>uint16_t</a:t>
+            </a:r>
+          </a:p>
+          <a:p>
+            <a:endParaRPr lang="en-US" dirty="0"/>
+          </a:p>
+          <a:p>
+            <a:endParaRPr lang="en-US" dirty="0"/>
+          </a:p>
+        </p:txBody>
+      </p:sp>
+      <p:sp>
+        <p:nvSpPr>
+          <p:cNvPr id="4" name="Text Placeholder 3"/>
+          <p:cNvSpPr>
+            <a:spLocks noGrp="1"/>
+          </p:cNvSpPr>
+          <p:nvPr>
+            <p:ph type="body" idx="2"/>
+          </p:nvPr>
+        </p:nvSpPr>
+        <p:spPr/>
+        <p:txBody>
+          <a:bodyPr/>
+          <a:lstStyle/>
+          <a:p>
+            <a:endParaRPr lang="en-US"/>
+          </a:p>
+        </p:txBody>
+      </p:sp>
+      <p:sp>
+        <p:nvSpPr>
+          <p:cNvPr id="5" name="Slide Number Placeholder 4"/>
+          <p:cNvSpPr>
+            <a:spLocks noGrp="1"/>
+          </p:cNvSpPr>
+          <p:nvPr>
+            <p:ph type="sldNum" idx="12"/>
+          </p:nvPr>
+        </p:nvSpPr>
+        <p:spPr/>
+        <p:txBody>
+          <a:bodyPr/>
+          <a:lstStyle/>
+          <a:p>
+            <a:fld id="{00000000-1234-1234-1234-123412341234}" type="slidenum">
+              <a:rPr lang="en" smtClean="0"/>
+              <a:pPr/>
+              <a:t>24</a:t>
+            </a:fld>
+            <a:endParaRPr lang="en"/>
+          </a:p>
+        </p:txBody>
+      </p:sp>
+    </p:spTree>
+    <p:extLst>
+      <p:ext uri="{BB962C8B-B14F-4D97-AF65-F5344CB8AC3E}">
+        <p14:creationId xmlns:p14="http://schemas.microsoft.com/office/powerpoint/2010/main" val="1657305523"/>
+      </p:ext>
+    </p:extLst>
+  </p:cSld>
+  <p:clrMapOvr>
+    <a:masterClrMapping/>
+  </p:clrMapOvr>
+</p:sld>
+</file>
+
+<file path=ppt/slides/slide25.xml><?xml version="1.0" encoding="utf-8"?>
+<p:sld xmlns:a="http://schemas.openxmlformats.org/drawingml/2006/main" xmlns:r="http://schemas.openxmlformats.org/officeDocument/2006/relationships" xmlns:p="http://schemas.openxmlformats.org/presentationml/2006/main">
+  <p:cSld>
+    <p:spTree>
+      <p:nvGrpSpPr>
+        <p:cNvPr id="1" name=""/>
+        <p:cNvGrpSpPr/>
+        <p:nvPr/>
+      </p:nvGrpSpPr>
+      <p:grpSpPr>
+        <a:xfrm>
+          <a:off x="0" y="0"/>
+          <a:ext cx="0" cy="0"/>
+          <a:chOff x="0" y="0"/>
+          <a:chExt cx="0" cy="0"/>
+        </a:xfrm>
+      </p:grpSpPr>
+      <p:sp>
+        <p:nvSpPr>
+          <p:cNvPr id="2" name="Title 1"/>
+          <p:cNvSpPr>
+            <a:spLocks noGrp="1"/>
+          </p:cNvSpPr>
+          <p:nvPr>
+            <p:ph type="title"/>
+          </p:nvPr>
+        </p:nvSpPr>
+        <p:spPr/>
+        <p:txBody>
+          <a:bodyPr/>
+          <a:lstStyle/>
+          <a:p>
+            <a:r>
+              <a:rPr lang="en-US" dirty="0" smtClean="0"/>
+              <a:t>Example: Our First Program</a:t>
+            </a:r>
+            <a:endParaRPr lang="en-US" dirty="0"/>
+          </a:p>
+        </p:txBody>
+      </p:sp>
+      <p:sp>
+        <p:nvSpPr>
+          <p:cNvPr id="3" name="Text Placeholder 2"/>
+          <p:cNvSpPr>
+            <a:spLocks noGrp="1"/>
+          </p:cNvSpPr>
+          <p:nvPr>
+            <p:ph type="body" idx="1"/>
+          </p:nvPr>
+        </p:nvSpPr>
+        <p:spPr/>
+        <p:txBody>
+          <a:bodyPr/>
+          <a:lstStyle/>
+          <a:p>
+            <a:r>
+              <a:rPr lang="en-US" dirty="0" smtClean="0"/>
+              <a:t>Step 1: Turn on the light</a:t>
+            </a:r>
+          </a:p>
+          <a:p>
+            <a:endParaRPr lang="en-US" dirty="0" smtClean="0"/>
+          </a:p>
+          <a:p>
+            <a:r>
+              <a:rPr lang="en-US" dirty="0" smtClean="0"/>
+              <a:t>1.0</a:t>
+            </a:r>
+            <a:endParaRPr lang="en-US" dirty="0"/>
+          </a:p>
+          <a:p>
+            <a:endParaRPr lang="en-US" dirty="0" smtClean="0"/>
+          </a:p>
+          <a:p>
+            <a:endParaRPr lang="en-US" dirty="0"/>
+          </a:p>
+        </p:txBody>
+      </p:sp>
+      <p:sp>
+        <p:nvSpPr>
+          <p:cNvPr id="4" name="Text Placeholder 3"/>
+          <p:cNvSpPr>
+            <a:spLocks noGrp="1"/>
+          </p:cNvSpPr>
+          <p:nvPr>
+            <p:ph type="body" idx="2"/>
+          </p:nvPr>
+        </p:nvSpPr>
+        <p:spPr/>
+        <p:txBody>
+          <a:bodyPr/>
+          <a:lstStyle/>
+          <a:p>
+            <a:endParaRPr lang="en-US"/>
+          </a:p>
+        </p:txBody>
+      </p:sp>
+      <p:sp>
+        <p:nvSpPr>
+          <p:cNvPr id="5" name="Slide Number Placeholder 4"/>
+          <p:cNvSpPr>
+            <a:spLocks noGrp="1"/>
+          </p:cNvSpPr>
+          <p:nvPr>
+            <p:ph type="sldNum" idx="12"/>
+          </p:nvPr>
+        </p:nvSpPr>
+        <p:spPr/>
+        <p:txBody>
+          <a:bodyPr/>
+          <a:lstStyle/>
+          <a:p>
+            <a:fld id="{00000000-1234-1234-1234-123412341234}" type="slidenum">
+              <a:rPr lang="en" smtClean="0"/>
+              <a:pPr/>
+              <a:t>25</a:t>
             </a:fld>
             <a:endParaRPr lang="en"/>
           </a:p>
@@ -5482,7 +5822,7 @@
 </p:sld>
 </file>
 
-<file path=ppt/slides/slide24.xml><?xml version="1.0" encoding="utf-8"?>
+<file path=ppt/slides/slide26.xml><?xml version="1.0" encoding="utf-8"?>
 <p:sld xmlns:a="http://schemas.openxmlformats.org/drawingml/2006/main" xmlns:r="http://schemas.openxmlformats.org/officeDocument/2006/relationships" xmlns:p="http://schemas.openxmlformats.org/presentationml/2006/main">
   <p:cSld>
     <p:spTree>
@@ -5549,6 +5889,10 @@
             <a:endParaRPr lang="en-US" dirty="0"/>
           </a:p>
           <a:p>
+            <a:r>
+              <a:rPr lang="en-US" dirty="0" smtClean="0"/>
+              <a:t>1.1</a:t>
+            </a:r>
             <a:endParaRPr lang="en-US" dirty="0" smtClean="0"/>
           </a:p>
           <a:p>
@@ -5611,7 +5955,7 @@
             <a:fld id="{00000000-1234-1234-1234-123412341234}" type="slidenum">
               <a:rPr lang="en" smtClean="0"/>
               <a:pPr/>
-              <a:t>24</a:t>
+              <a:t>26</a:t>
             </a:fld>
             <a:endParaRPr lang="en"/>
           </a:p>
@@ -5660,232 +6004,6 @@
 </p:sld>
 </file>
 
-<file path=ppt/slides/slide25.xml><?xml version="1.0" encoding="utf-8"?>
-<p:sld xmlns:a="http://schemas.openxmlformats.org/drawingml/2006/main" xmlns:r="http://schemas.openxmlformats.org/officeDocument/2006/relationships" xmlns:p="http://schemas.openxmlformats.org/presentationml/2006/main">
-  <p:cSld>
-    <p:spTree>
-      <p:nvGrpSpPr>
-        <p:cNvPr id="1" name=""/>
-        <p:cNvGrpSpPr/>
-        <p:nvPr/>
-      </p:nvGrpSpPr>
-      <p:grpSpPr>
-        <a:xfrm>
-          <a:off x="0" y="0"/>
-          <a:ext cx="0" cy="0"/>
-          <a:chOff x="0" y="0"/>
-          <a:chExt cx="0" cy="0"/>
-        </a:xfrm>
-      </p:grpSpPr>
-      <p:sp>
-        <p:nvSpPr>
-          <p:cNvPr id="2" name="Title 1"/>
-          <p:cNvSpPr>
-            <a:spLocks noGrp="1"/>
-          </p:cNvSpPr>
-          <p:nvPr>
-            <p:ph type="title"/>
-          </p:nvPr>
-        </p:nvSpPr>
-        <p:spPr/>
-        <p:txBody>
-          <a:bodyPr/>
-          <a:lstStyle/>
-          <a:p>
-            <a:endParaRPr lang="en-US"/>
-          </a:p>
-        </p:txBody>
-      </p:sp>
-      <p:sp>
-        <p:nvSpPr>
-          <p:cNvPr id="3" name="Text Placeholder 2"/>
-          <p:cNvSpPr>
-            <a:spLocks noGrp="1"/>
-          </p:cNvSpPr>
-          <p:nvPr>
-            <p:ph type="body" idx="1"/>
-          </p:nvPr>
-        </p:nvSpPr>
-        <p:spPr/>
-        <p:txBody>
-          <a:bodyPr/>
-          <a:lstStyle/>
-          <a:p>
-            <a:endParaRPr lang="en-US"/>
-          </a:p>
-        </p:txBody>
-      </p:sp>
-      <p:sp>
-        <p:nvSpPr>
-          <p:cNvPr id="4" name="Text Placeholder 3"/>
-          <p:cNvSpPr>
-            <a:spLocks noGrp="1"/>
-          </p:cNvSpPr>
-          <p:nvPr>
-            <p:ph type="body" idx="2"/>
-          </p:nvPr>
-        </p:nvSpPr>
-        <p:spPr/>
-        <p:txBody>
-          <a:bodyPr/>
-          <a:lstStyle/>
-          <a:p>
-            <a:endParaRPr lang="en-US"/>
-          </a:p>
-        </p:txBody>
-      </p:sp>
-      <p:sp>
-        <p:nvSpPr>
-          <p:cNvPr id="5" name="Slide Number Placeholder 4"/>
-          <p:cNvSpPr>
-            <a:spLocks noGrp="1"/>
-          </p:cNvSpPr>
-          <p:nvPr>
-            <p:ph type="sldNum" idx="12"/>
-          </p:nvPr>
-        </p:nvSpPr>
-        <p:spPr/>
-        <p:txBody>
-          <a:bodyPr/>
-          <a:lstStyle/>
-          <a:p>
-            <a:fld id="{00000000-1234-1234-1234-123412341234}" type="slidenum">
-              <a:rPr lang="en" smtClean="0"/>
-              <a:pPr/>
-              <a:t>25</a:t>
-            </a:fld>
-            <a:endParaRPr lang="en"/>
-          </a:p>
-        </p:txBody>
-      </p:sp>
-    </p:spTree>
-    <p:extLst>
-      <p:ext uri="{BB962C8B-B14F-4D97-AF65-F5344CB8AC3E}">
-        <p14:creationId xmlns:p14="http://schemas.microsoft.com/office/powerpoint/2010/main" val="4024481564"/>
-      </p:ext>
-    </p:extLst>
-  </p:cSld>
-  <p:clrMapOvr>
-    <a:masterClrMapping/>
-  </p:clrMapOvr>
-</p:sld>
-</file>
-
-<file path=ppt/slides/slide26.xml><?xml version="1.0" encoding="utf-8"?>
-<p:sld xmlns:a="http://schemas.openxmlformats.org/drawingml/2006/main" xmlns:r="http://schemas.openxmlformats.org/officeDocument/2006/relationships" xmlns:p="http://schemas.openxmlformats.org/presentationml/2006/main">
-  <p:cSld>
-    <p:spTree>
-      <p:nvGrpSpPr>
-        <p:cNvPr id="1" name=""/>
-        <p:cNvGrpSpPr/>
-        <p:nvPr/>
-      </p:nvGrpSpPr>
-      <p:grpSpPr>
-        <a:xfrm>
-          <a:off x="0" y="0"/>
-          <a:ext cx="0" cy="0"/>
-          <a:chOff x="0" y="0"/>
-          <a:chExt cx="0" cy="0"/>
-        </a:xfrm>
-      </p:grpSpPr>
-      <p:sp>
-        <p:nvSpPr>
-          <p:cNvPr id="2" name="Title 1"/>
-          <p:cNvSpPr>
-            <a:spLocks noGrp="1"/>
-          </p:cNvSpPr>
-          <p:nvPr>
-            <p:ph type="title"/>
-          </p:nvPr>
-        </p:nvSpPr>
-        <p:spPr/>
-        <p:txBody>
-          <a:bodyPr/>
-          <a:lstStyle/>
-          <a:p>
-            <a:r>
-              <a:rPr lang="en-US" dirty="0" smtClean="0"/>
-              <a:t>Debugging with Arduino</a:t>
-            </a:r>
-            <a:endParaRPr lang="en-US" dirty="0"/>
-          </a:p>
-        </p:txBody>
-      </p:sp>
-      <p:sp>
-        <p:nvSpPr>
-          <p:cNvPr id="3" name="Text Placeholder 2"/>
-          <p:cNvSpPr>
-            <a:spLocks noGrp="1"/>
-          </p:cNvSpPr>
-          <p:nvPr>
-            <p:ph type="body" idx="1"/>
-          </p:nvPr>
-        </p:nvSpPr>
-        <p:spPr/>
-        <p:txBody>
-          <a:bodyPr/>
-          <a:lstStyle/>
-          <a:p>
-            <a:endParaRPr lang="en-US"/>
-          </a:p>
-        </p:txBody>
-      </p:sp>
-      <p:sp>
-        <p:nvSpPr>
-          <p:cNvPr id="4" name="Text Placeholder 3"/>
-          <p:cNvSpPr>
-            <a:spLocks noGrp="1"/>
-          </p:cNvSpPr>
-          <p:nvPr>
-            <p:ph type="body" idx="2"/>
-          </p:nvPr>
-        </p:nvSpPr>
-        <p:spPr/>
-        <p:txBody>
-          <a:bodyPr/>
-          <a:lstStyle/>
-          <a:p>
-            <a:endParaRPr lang="en-US"/>
-          </a:p>
-        </p:txBody>
-      </p:sp>
-      <p:sp>
-        <p:nvSpPr>
-          <p:cNvPr id="5" name="Slide Number Placeholder 4"/>
-          <p:cNvSpPr>
-            <a:spLocks noGrp="1"/>
-          </p:cNvSpPr>
-          <p:nvPr>
-            <p:ph type="sldNum" idx="12"/>
-          </p:nvPr>
-        </p:nvSpPr>
-        <p:spPr/>
-        <p:txBody>
-          <a:bodyPr/>
-          <a:lstStyle/>
-          <a:p>
-            <a:fld id="{00000000-1234-1234-1234-123412341234}" type="slidenum">
-              <a:rPr lang="en" smtClean="0"/>
-              <a:pPr/>
-              <a:t>26</a:t>
-            </a:fld>
-            <a:endParaRPr lang="en"/>
-          </a:p>
-        </p:txBody>
-      </p:sp>
-    </p:spTree>
-    <p:extLst>
-      <p:ext uri="{BB962C8B-B14F-4D97-AF65-F5344CB8AC3E}">
-        <p14:creationId xmlns:p14="http://schemas.microsoft.com/office/powerpoint/2010/main" val="2986079998"/>
-      </p:ext>
-    </p:extLst>
-  </p:cSld>
-  <p:clrMapOvr>
-    <a:masterClrMapping/>
-  </p:clrMapOvr>
-</p:sld>
-</file>
-
 <file path=ppt/slides/slide27.xml><?xml version="1.0" encoding="utf-8"?>
 <p:sld xmlns:a="http://schemas.openxmlformats.org/drawingml/2006/main" xmlns:r="http://schemas.openxmlformats.org/officeDocument/2006/relationships" xmlns:p="http://schemas.openxmlformats.org/presentationml/2006/main">
   <p:cSld>
@@ -5918,32 +6036,28 @@
           <a:bodyPr/>
           <a:lstStyle/>
           <a:p>
+            <a:endParaRPr lang="en-US"/>
+          </a:p>
+        </p:txBody>
+      </p:sp>
+      <p:sp>
+        <p:nvSpPr>
+          <p:cNvPr id="3" name="Text Placeholder 2"/>
+          <p:cNvSpPr>
+            <a:spLocks noGrp="1"/>
+          </p:cNvSpPr>
+          <p:nvPr>
+            <p:ph type="body" idx="1"/>
+          </p:nvPr>
+        </p:nvSpPr>
+        <p:spPr/>
+        <p:txBody>
+          <a:bodyPr/>
+          <a:lstStyle/>
+          <a:p>
             <a:r>
               <a:rPr lang="en-US" dirty="0" smtClean="0"/>
-              <a:t>Example: Our First Program</a:t>
-            </a:r>
-            <a:endParaRPr lang="en-US" dirty="0"/>
-          </a:p>
-        </p:txBody>
-      </p:sp>
-      <p:sp>
-        <p:nvSpPr>
-          <p:cNvPr id="3" name="Text Placeholder 2"/>
-          <p:cNvSpPr>
-            <a:spLocks noGrp="1"/>
-          </p:cNvSpPr>
-          <p:nvPr>
-            <p:ph type="body" idx="1"/>
-          </p:nvPr>
-        </p:nvSpPr>
-        <p:spPr/>
-        <p:txBody>
-          <a:bodyPr/>
-          <a:lstStyle/>
-          <a:p>
-            <a:r>
-              <a:rPr lang="en-US" dirty="0" smtClean="0"/>
-              <a:t>Steps: 1</a:t>
+              <a:t>1.2</a:t>
             </a:r>
             <a:endParaRPr lang="en-US" dirty="0"/>
           </a:p>
@@ -6014,8 +6128,8 @@
         </p:blipFill>
         <p:spPr>
           <a:xfrm>
-            <a:off x="3519205" y="1207295"/>
-            <a:ext cx="2995875" cy="3550833"/>
+            <a:off x="2518376" y="0"/>
+            <a:ext cx="4339624" cy="5143500"/>
           </a:xfrm>
           <a:prstGeom prst="rect">
             <a:avLst/>
@@ -6025,7 +6139,7 @@
     </p:spTree>
     <p:extLst>
       <p:ext uri="{BB962C8B-B14F-4D97-AF65-F5344CB8AC3E}">
-        <p14:creationId xmlns:p14="http://schemas.microsoft.com/office/powerpoint/2010/main" val="2532792670"/>
+        <p14:creationId xmlns:p14="http://schemas.microsoft.com/office/powerpoint/2010/main" val="4024481564"/>
       </p:ext>
     </p:extLst>
   </p:cSld>
@@ -6069,7 +6183,7 @@
           <a:p>
             <a:r>
               <a:rPr lang="en-US" dirty="0" smtClean="0"/>
-              <a:t>Example: Our First Program</a:t>
+              <a:t>Debugging with Arduino</a:t>
             </a:r>
             <a:endParaRPr lang="en-US" dirty="0"/>
           </a:p>
@@ -6092,10 +6206,33 @@
           <a:p>
             <a:r>
               <a:rPr lang="en-US" dirty="0" smtClean="0"/>
-              <a:t>Steps: 1</a:t>
-            </a:r>
+              <a:t>Use Serial Port </a:t>
+            </a:r>
+          </a:p>
+          <a:p>
+            <a:endParaRPr lang="en-US" dirty="0" smtClean="0"/>
+          </a:p>
+          <a:p>
+            <a:r>
+              <a:rPr lang="en-US" dirty="0" smtClean="0"/>
+              <a:t>What is Serial Communication? </a:t>
+            </a:r>
+          </a:p>
+          <a:p>
             <a:endParaRPr lang="en-US" dirty="0"/>
           </a:p>
+          <a:p>
+            <a:r>
+              <a:rPr lang="en-US" dirty="0" smtClean="0"/>
+              <a:t>Communication through the tin cans</a:t>
+            </a:r>
+          </a:p>
+          <a:p>
+            <a:endParaRPr lang="en-US" dirty="0"/>
+          </a:p>
+          <a:p>
+            <a:endParaRPr lang="en-US" dirty="0"/>
+          </a:p>
         </p:txBody>
       </p:sp>
       <p:sp>
@@ -6113,7 +6250,7 @@
           <a:bodyPr/>
           <a:lstStyle/>
           <a:p>
-            <a:endParaRPr lang="en-US"/>
+            <a:endParaRPr lang="en-US" dirty="0"/>
           </a:p>
         </p:txBody>
       </p:sp>
@@ -6143,9 +6280,9 @@
       </p:sp>
       <p:pic>
         <p:nvPicPr>
-          <p:cNvPr id="6" name="Picture 5"/>
+          <p:cNvPr id="2050" name="Picture 2" descr="http://i144.photobucket.com/albums/r166/Funnyoldlife/tin-can-telephone.jpg"/>
           <p:cNvPicPr>
-            <a:picLocks noChangeAspect="1"/>
+            <a:picLocks noChangeAspect="1" noChangeArrowheads="1"/>
           </p:cNvPicPr>
           <p:nvPr/>
         </p:nvPicPr>
@@ -6157,24 +6294,35 @@
               </a:ext>
             </a:extLst>
           </a:blip>
+          <a:srcRect/>
           <a:stretch>
             <a:fillRect/>
           </a:stretch>
         </p:blipFill>
-        <p:spPr>
+        <p:spPr bwMode="auto">
           <a:xfrm>
-            <a:off x="3519205" y="1207295"/>
-            <a:ext cx="2995875" cy="3550833"/>
+            <a:off x="3174019" y="1504442"/>
+            <a:ext cx="3449338" cy="2118014"/>
           </a:xfrm>
           <a:prstGeom prst="rect">
             <a:avLst/>
           </a:prstGeom>
+          <a:noFill/>
+          <a:extLst>
+            <a:ext uri="{909E8E84-426E-40DD-AFC4-6F175D3DCCD1}">
+              <a14:hiddenFill xmlns:a14="http://schemas.microsoft.com/office/drawing/2010/main">
+                <a:solidFill>
+                  <a:srgbClr val="FFFFFF"/>
+                </a:solidFill>
+              </a14:hiddenFill>
+            </a:ext>
+          </a:extLst>
         </p:spPr>
       </p:pic>
     </p:spTree>
     <p:extLst>
       <p:ext uri="{BB962C8B-B14F-4D97-AF65-F5344CB8AC3E}">
-        <p14:creationId xmlns:p14="http://schemas.microsoft.com/office/powerpoint/2010/main" val="829757792"/>
+        <p14:creationId xmlns:p14="http://schemas.microsoft.com/office/powerpoint/2010/main" val="2016321318"/>
       </p:ext>
     </p:extLst>
   </p:cSld>
@@ -6218,7 +6366,7 @@
           <a:p>
             <a:r>
               <a:rPr lang="en-US" dirty="0" smtClean="0"/>
-              <a:t>Example: Multiple LEDs</a:t>
+              <a:t>Debugging with Arduino</a:t>
             </a:r>
             <a:endParaRPr lang="en-US" dirty="0"/>
           </a:p>
@@ -6239,7 +6387,34 @@
           <a:bodyPr/>
           <a:lstStyle/>
           <a:p>
-            <a:endParaRPr lang="en-US"/>
+            <a:r>
+              <a:rPr lang="en-US" dirty="0" smtClean="0"/>
+              <a:t>Use Serial Port </a:t>
+            </a:r>
+          </a:p>
+          <a:p>
+            <a:endParaRPr lang="en-US" dirty="0" smtClean="0"/>
+          </a:p>
+          <a:p>
+            <a:r>
+              <a:rPr lang="en-US" dirty="0" smtClean="0"/>
+              <a:t>What is Serial Communication? </a:t>
+            </a:r>
+          </a:p>
+          <a:p>
+            <a:endParaRPr lang="en-US" dirty="0"/>
+          </a:p>
+          <a:p>
+            <a:r>
+              <a:rPr lang="en-US" dirty="0" smtClean="0"/>
+              <a:t>Communication through the tin cans</a:t>
+            </a:r>
+          </a:p>
+          <a:p>
+            <a:endParaRPr lang="en-US" dirty="0"/>
+          </a:p>
+          <a:p>
+            <a:endParaRPr lang="en-US" dirty="0"/>
           </a:p>
         </p:txBody>
       </p:sp>
@@ -6258,7 +6433,7 @@
           <a:bodyPr/>
           <a:lstStyle/>
           <a:p>
-            <a:endParaRPr lang="en-US"/>
+            <a:endParaRPr lang="en-US" dirty="0"/>
           </a:p>
         </p:txBody>
       </p:sp>
@@ -6286,10 +6461,51 @@
           </a:p>
         </p:txBody>
       </p:sp>
+      <p:pic>
+        <p:nvPicPr>
+          <p:cNvPr id="1026" name="Picture 2" descr="http://www.fiz-ix.com/wp-content/uploads/2013/02/SerialCommunication.png"/>
+          <p:cNvPicPr>
+            <a:picLocks noChangeAspect="1" noChangeArrowheads="1"/>
+          </p:cNvPicPr>
+          <p:nvPr/>
+        </p:nvPicPr>
+        <p:blipFill>
+          <a:blip r:embed="rId2">
+            <a:extLst>
+              <a:ext uri="{28A0092B-C50C-407E-A947-70E740481C1C}">
+                <a14:useLocalDpi xmlns:a14="http://schemas.microsoft.com/office/drawing/2010/main" val="0"/>
+              </a:ext>
+            </a:extLst>
+          </a:blip>
+          <a:srcRect/>
+          <a:stretch>
+            <a:fillRect/>
+          </a:stretch>
+        </p:blipFill>
+        <p:spPr bwMode="auto">
+          <a:xfrm>
+            <a:off x="2782415" y="2296690"/>
+            <a:ext cx="4469455" cy="2453160"/>
+          </a:xfrm>
+          <a:prstGeom prst="rect">
+            <a:avLst/>
+          </a:prstGeom>
+          <a:noFill/>
+          <a:extLst>
+            <a:ext uri="{909E8E84-426E-40DD-AFC4-6F175D3DCCD1}">
+              <a14:hiddenFill xmlns:a14="http://schemas.microsoft.com/office/drawing/2010/main">
+                <a:solidFill>
+                  <a:srgbClr val="FFFFFF"/>
+                </a:solidFill>
+              </a14:hiddenFill>
+            </a:ext>
+          </a:extLst>
+        </p:spPr>
+      </p:pic>
     </p:spTree>
     <p:extLst>
       <p:ext uri="{BB962C8B-B14F-4D97-AF65-F5344CB8AC3E}">
-        <p14:creationId xmlns:p14="http://schemas.microsoft.com/office/powerpoint/2010/main" val="2556595230"/>
+        <p14:creationId xmlns:p14="http://schemas.microsoft.com/office/powerpoint/2010/main" val="2986079998"/>
       </p:ext>
     </p:extLst>
   </p:cSld>
@@ -6448,7 +6664,7 @@
           <a:p>
             <a:r>
               <a:rPr lang="en-US" dirty="0" smtClean="0"/>
-              <a:t>Data Sheet and Circuit Diagram</a:t>
+              <a:t>Additional Options</a:t>
             </a:r>
             <a:endParaRPr lang="en-US" dirty="0"/>
           </a:p>
@@ -6469,7 +6685,13 @@
           <a:bodyPr/>
           <a:lstStyle/>
           <a:p>
-            <a:endParaRPr lang="en-US"/>
+            <a:r>
+              <a:rPr lang="en-US" dirty="0" smtClean="0"/>
+              <a:t>Visual Micro </a:t>
+            </a:r>
+          </a:p>
+          <a:p>
+            <a:endParaRPr lang="en-US" dirty="0"/>
           </a:p>
         </p:txBody>
       </p:sp>
@@ -6488,7 +6710,7 @@
           <a:bodyPr/>
           <a:lstStyle/>
           <a:p>
-            <a:endParaRPr lang="en-US"/>
+            <a:endParaRPr lang="en-US" dirty="0"/>
           </a:p>
         </p:txBody>
       </p:sp>
@@ -6516,10 +6738,40 @@
           </a:p>
         </p:txBody>
       </p:sp>
+      <p:pic>
+        <p:nvPicPr>
+          <p:cNvPr id="6" name="Picture 5"/>
+          <p:cNvPicPr>
+            <a:picLocks noChangeAspect="1"/>
+          </p:cNvPicPr>
+          <p:nvPr/>
+        </p:nvPicPr>
+        <p:blipFill>
+          <a:blip r:embed="rId2">
+            <a:extLst>
+              <a:ext uri="{28A0092B-C50C-407E-A947-70E740481C1C}">
+                <a14:useLocalDpi xmlns:a14="http://schemas.microsoft.com/office/drawing/2010/main" val="0"/>
+              </a:ext>
+            </a:extLst>
+          </a:blip>
+          <a:stretch>
+            <a:fillRect/>
+          </a:stretch>
+        </p:blipFill>
+        <p:spPr>
+          <a:xfrm>
+            <a:off x="2489495" y="795131"/>
+            <a:ext cx="4339624" cy="5143500"/>
+          </a:xfrm>
+          <a:prstGeom prst="rect">
+            <a:avLst/>
+          </a:prstGeom>
+        </p:spPr>
+      </p:pic>
     </p:spTree>
     <p:extLst>
       <p:ext uri="{BB962C8B-B14F-4D97-AF65-F5344CB8AC3E}">
-        <p14:creationId xmlns:p14="http://schemas.microsoft.com/office/powerpoint/2010/main" val="3265472192"/>
+        <p14:creationId xmlns:p14="http://schemas.microsoft.com/office/powerpoint/2010/main" val="3543590966"/>
       </p:ext>
     </p:extLst>
   </p:cSld>
@@ -6563,7 +6815,7 @@
           <a:p>
             <a:r>
               <a:rPr lang="en-US" dirty="0" smtClean="0"/>
-              <a:t>Example: Reading And Writing</a:t>
+              <a:t>Example: Our First Program</a:t>
             </a:r>
             <a:endParaRPr lang="en-US" dirty="0"/>
           </a:p>
@@ -6584,7 +6836,37 @@
           <a:bodyPr/>
           <a:lstStyle/>
           <a:p>
-            <a:endParaRPr lang="en-US"/>
+            <a:r>
+              <a:rPr lang="en-US" dirty="0" smtClean="0"/>
+              <a:t>Steps</a:t>
+            </a:r>
+            <a:r>
+              <a:rPr lang="en-US" dirty="0" smtClean="0"/>
+              <a:t>: </a:t>
+            </a:r>
+            <a:r>
+              <a:rPr lang="en-US" dirty="0" smtClean="0"/>
+              <a:t>1</a:t>
+            </a:r>
+          </a:p>
+          <a:p>
+            <a:endParaRPr lang="en-US" dirty="0"/>
+          </a:p>
+          <a:p>
+            <a:endParaRPr lang="en-US" dirty="0" smtClean="0"/>
+          </a:p>
+          <a:p>
+            <a:endParaRPr lang="en-US" dirty="0"/>
+          </a:p>
+          <a:p>
+            <a:endParaRPr lang="en-US" dirty="0" smtClean="0"/>
+          </a:p>
+          <a:p>
+            <a:r>
+              <a:rPr lang="en-US" dirty="0" smtClean="0"/>
+              <a:t>2.0</a:t>
+            </a:r>
+            <a:endParaRPr lang="en-US" dirty="0"/>
           </a:p>
         </p:txBody>
       </p:sp>
@@ -6631,10 +6913,40 @@
           </a:p>
         </p:txBody>
       </p:sp>
+      <p:pic>
+        <p:nvPicPr>
+          <p:cNvPr id="7" name="Picture 6"/>
+          <p:cNvPicPr>
+            <a:picLocks noChangeAspect="1"/>
+          </p:cNvPicPr>
+          <p:nvPr/>
+        </p:nvPicPr>
+        <p:blipFill>
+          <a:blip r:embed="rId2">
+            <a:extLst>
+              <a:ext uri="{28A0092B-C50C-407E-A947-70E740481C1C}">
+                <a14:useLocalDpi xmlns:a14="http://schemas.microsoft.com/office/drawing/2010/main" val="0"/>
+              </a:ext>
+            </a:extLst>
+          </a:blip>
+          <a:stretch>
+            <a:fillRect/>
+          </a:stretch>
+        </p:blipFill>
+        <p:spPr>
+          <a:xfrm>
+            <a:off x="3338776" y="205978"/>
+            <a:ext cx="4339624" cy="5143500"/>
+          </a:xfrm>
+          <a:prstGeom prst="rect">
+            <a:avLst/>
+          </a:prstGeom>
+        </p:spPr>
+      </p:pic>
     </p:spTree>
     <p:extLst>
       <p:ext uri="{BB962C8B-B14F-4D97-AF65-F5344CB8AC3E}">
-        <p14:creationId xmlns:p14="http://schemas.microsoft.com/office/powerpoint/2010/main" val="3935780619"/>
+        <p14:creationId xmlns:p14="http://schemas.microsoft.com/office/powerpoint/2010/main" val="2532792670"/>
       </p:ext>
     </p:extLst>
   </p:cSld>
@@ -6678,15 +6990,15 @@
           <a:p>
             <a:r>
               <a:rPr lang="en-US" dirty="0" smtClean="0"/>
-              <a:t>Motivation: Domo </a:t>
-            </a:r>
-            <a:r>
-              <a:rPr lang="en-US" dirty="0" err="1" smtClean="0"/>
-              <a:t>Arigoto</a:t>
+              <a:t>Example: </a:t>
             </a:r>
             <a:r>
               <a:rPr lang="en-US" dirty="0" smtClean="0"/>
-              <a:t> </a:t>
+              <a:t>Debug Multiple </a:t>
+            </a:r>
+            <a:r>
+              <a:rPr lang="en-US" dirty="0" smtClean="0"/>
+              <a:t>LEDs</a:t>
             </a:r>
             <a:endParaRPr lang="en-US" dirty="0"/>
           </a:p>
@@ -6707,7 +7019,11 @@
           <a:bodyPr/>
           <a:lstStyle/>
           <a:p>
-            <a:endParaRPr lang="en-US"/>
+            <a:r>
+              <a:rPr lang="en-US" dirty="0" smtClean="0"/>
+              <a:t>2.1</a:t>
+            </a:r>
+            <a:endParaRPr lang="en-US" dirty="0" smtClean="0"/>
           </a:p>
         </p:txBody>
       </p:sp>
@@ -6754,10 +7070,40 @@
           </a:p>
         </p:txBody>
       </p:sp>
+      <p:pic>
+        <p:nvPicPr>
+          <p:cNvPr id="7" name="Picture 6"/>
+          <p:cNvPicPr>
+            <a:picLocks noChangeAspect="1"/>
+          </p:cNvPicPr>
+          <p:nvPr/>
+        </p:nvPicPr>
+        <p:blipFill>
+          <a:blip r:embed="rId2">
+            <a:extLst>
+              <a:ext uri="{28A0092B-C50C-407E-A947-70E740481C1C}">
+                <a14:useLocalDpi xmlns:a14="http://schemas.microsoft.com/office/drawing/2010/main" val="0"/>
+              </a:ext>
+            </a:extLst>
+          </a:blip>
+          <a:stretch>
+            <a:fillRect/>
+          </a:stretch>
+        </p:blipFill>
+        <p:spPr>
+          <a:xfrm>
+            <a:off x="2518376" y="334864"/>
+            <a:ext cx="4339624" cy="5143500"/>
+          </a:xfrm>
+          <a:prstGeom prst="rect">
+            <a:avLst/>
+          </a:prstGeom>
+        </p:spPr>
+      </p:pic>
     </p:spTree>
     <p:extLst>
       <p:ext uri="{BB962C8B-B14F-4D97-AF65-F5344CB8AC3E}">
-        <p14:creationId xmlns:p14="http://schemas.microsoft.com/office/powerpoint/2010/main" val="3214018131"/>
+        <p14:creationId xmlns:p14="http://schemas.microsoft.com/office/powerpoint/2010/main" val="2117771194"/>
       </p:ext>
     </p:extLst>
   </p:cSld>
@@ -6801,7 +7147,15 @@
           <a:p>
             <a:r>
               <a:rPr lang="en-US" dirty="0" smtClean="0"/>
-              <a:t>Sensing</a:t>
+              <a:t>Example: </a:t>
+            </a:r>
+            <a:r>
+              <a:rPr lang="en-US" dirty="0" smtClean="0"/>
+              <a:t>Debug Multiple </a:t>
+            </a:r>
+            <a:r>
+              <a:rPr lang="en-US" dirty="0" smtClean="0"/>
+              <a:t>LEDs</a:t>
             </a:r>
             <a:endParaRPr lang="en-US" dirty="0"/>
           </a:p>
@@ -6822,7 +7176,11 @@
           <a:bodyPr/>
           <a:lstStyle/>
           <a:p>
-            <a:endParaRPr lang="en-US"/>
+            <a:r>
+              <a:rPr lang="en-US" dirty="0" smtClean="0"/>
+              <a:t>2.1</a:t>
+            </a:r>
+            <a:endParaRPr lang="en-US" dirty="0"/>
           </a:p>
         </p:txBody>
       </p:sp>
@@ -6869,10 +7227,40 @@
           </a:p>
         </p:txBody>
       </p:sp>
+      <p:pic>
+        <p:nvPicPr>
+          <p:cNvPr id="6" name="Picture 5"/>
+          <p:cNvPicPr>
+            <a:picLocks noChangeAspect="1"/>
+          </p:cNvPicPr>
+          <p:nvPr/>
+        </p:nvPicPr>
+        <p:blipFill>
+          <a:blip r:embed="rId2">
+            <a:extLst>
+              <a:ext uri="{28A0092B-C50C-407E-A947-70E740481C1C}">
+                <a14:useLocalDpi xmlns:a14="http://schemas.microsoft.com/office/drawing/2010/main" val="0"/>
+              </a:ext>
+            </a:extLst>
+          </a:blip>
+          <a:stretch>
+            <a:fillRect/>
+          </a:stretch>
+        </p:blipFill>
+        <p:spPr>
+          <a:xfrm>
+            <a:off x="3176888" y="1063378"/>
+            <a:ext cx="4339624" cy="5143500"/>
+          </a:xfrm>
+          <a:prstGeom prst="rect">
+            <a:avLst/>
+          </a:prstGeom>
+        </p:spPr>
+      </p:pic>
     </p:spTree>
     <p:extLst>
       <p:ext uri="{BB962C8B-B14F-4D97-AF65-F5344CB8AC3E}">
-        <p14:creationId xmlns:p14="http://schemas.microsoft.com/office/powerpoint/2010/main" val="38753212"/>
+        <p14:creationId xmlns:p14="http://schemas.microsoft.com/office/powerpoint/2010/main" val="2556595230"/>
       </p:ext>
     </p:extLst>
   </p:cSld>
@@ -6916,7 +7304,7 @@
           <a:p>
             <a:r>
               <a:rPr lang="en-US" dirty="0" smtClean="0"/>
-              <a:t>Encoders</a:t>
+              <a:t>Data Sheet and Circuit Diagram</a:t>
             </a:r>
             <a:endParaRPr lang="en-US" dirty="0"/>
           </a:p>
@@ -6987,7 +7375,7 @@
     </p:spTree>
     <p:extLst>
       <p:ext uri="{BB962C8B-B14F-4D97-AF65-F5344CB8AC3E}">
-        <p14:creationId xmlns:p14="http://schemas.microsoft.com/office/powerpoint/2010/main" val="1802192246"/>
+        <p14:creationId xmlns:p14="http://schemas.microsoft.com/office/powerpoint/2010/main" val="3265472192"/>
       </p:ext>
     </p:extLst>
   </p:cSld>
@@ -7031,7 +7419,7 @@
           <a:p>
             <a:r>
               <a:rPr lang="en-US" dirty="0" smtClean="0"/>
-              <a:t>Example: Reading Positions</a:t>
+              <a:t>Example: Reading And Writing</a:t>
             </a:r>
             <a:endParaRPr lang="en-US" dirty="0"/>
           </a:p>
@@ -7052,7 +7440,11 @@
           <a:bodyPr/>
           <a:lstStyle/>
           <a:p>
-            <a:endParaRPr lang="en-US"/>
+            <a:r>
+              <a:rPr lang="en-US" dirty="0" smtClean="0"/>
+              <a:t>3.0</a:t>
+            </a:r>
+            <a:endParaRPr lang="en-US" dirty="0"/>
           </a:p>
         </p:txBody>
       </p:sp>
@@ -7099,10 +7491,40 @@
           </a:p>
         </p:txBody>
       </p:sp>
+      <p:pic>
+        <p:nvPicPr>
+          <p:cNvPr id="6" name="Picture 5"/>
+          <p:cNvPicPr>
+            <a:picLocks noChangeAspect="1"/>
+          </p:cNvPicPr>
+          <p:nvPr/>
+        </p:nvPicPr>
+        <p:blipFill>
+          <a:blip r:embed="rId2">
+            <a:extLst>
+              <a:ext uri="{28A0092B-C50C-407E-A947-70E740481C1C}">
+                <a14:useLocalDpi xmlns:a14="http://schemas.microsoft.com/office/drawing/2010/main" val="0"/>
+              </a:ext>
+            </a:extLst>
+          </a:blip>
+          <a:stretch>
+            <a:fillRect/>
+          </a:stretch>
+        </p:blipFill>
+        <p:spPr>
+          <a:xfrm>
+            <a:off x="2283733" y="0"/>
+            <a:ext cx="4339624" cy="5143500"/>
+          </a:xfrm>
+          <a:prstGeom prst="rect">
+            <a:avLst/>
+          </a:prstGeom>
+        </p:spPr>
+      </p:pic>
     </p:spTree>
     <p:extLst>
       <p:ext uri="{BB962C8B-B14F-4D97-AF65-F5344CB8AC3E}">
-        <p14:creationId xmlns:p14="http://schemas.microsoft.com/office/powerpoint/2010/main" val="660564970"/>
+        <p14:creationId xmlns:p14="http://schemas.microsoft.com/office/powerpoint/2010/main" val="3935780619"/>
       </p:ext>
     </p:extLst>
   </p:cSld>
@@ -7146,7 +7568,7 @@
           <a:p>
             <a:r>
               <a:rPr lang="en-US" dirty="0" smtClean="0"/>
-              <a:t>Actuation</a:t>
+              <a:t>Example: Reading And Writing</a:t>
             </a:r>
             <a:endParaRPr lang="en-US" dirty="0"/>
           </a:p>
@@ -7167,7 +7589,11 @@
           <a:bodyPr/>
           <a:lstStyle/>
           <a:p>
-            <a:endParaRPr lang="en-US"/>
+            <a:r>
+              <a:rPr lang="en-US" dirty="0" smtClean="0"/>
+              <a:t>3.1</a:t>
+            </a:r>
+            <a:endParaRPr lang="en-US" dirty="0"/>
           </a:p>
         </p:txBody>
       </p:sp>
@@ -7214,10 +7640,40 @@
           </a:p>
         </p:txBody>
       </p:sp>
+      <p:pic>
+        <p:nvPicPr>
+          <p:cNvPr id="7" name="Picture 6"/>
+          <p:cNvPicPr>
+            <a:picLocks noChangeAspect="1"/>
+          </p:cNvPicPr>
+          <p:nvPr/>
+        </p:nvPicPr>
+        <p:blipFill>
+          <a:blip r:embed="rId2">
+            <a:extLst>
+              <a:ext uri="{28A0092B-C50C-407E-A947-70E740481C1C}">
+                <a14:useLocalDpi xmlns:a14="http://schemas.microsoft.com/office/drawing/2010/main" val="0"/>
+              </a:ext>
+            </a:extLst>
+          </a:blip>
+          <a:stretch>
+            <a:fillRect/>
+          </a:stretch>
+        </p:blipFill>
+        <p:spPr>
+          <a:xfrm>
+            <a:off x="2283733" y="491252"/>
+            <a:ext cx="4339624" cy="5143500"/>
+          </a:xfrm>
+          <a:prstGeom prst="rect">
+            <a:avLst/>
+          </a:prstGeom>
+        </p:spPr>
+      </p:pic>
     </p:spTree>
     <p:extLst>
       <p:ext uri="{BB962C8B-B14F-4D97-AF65-F5344CB8AC3E}">
-        <p14:creationId xmlns:p14="http://schemas.microsoft.com/office/powerpoint/2010/main" val="846365663"/>
+        <p14:creationId xmlns:p14="http://schemas.microsoft.com/office/powerpoint/2010/main" val="1674620375"/>
       </p:ext>
     </p:extLst>
   </p:cSld>
@@ -7261,7 +7717,7 @@
           <a:p>
             <a:r>
               <a:rPr lang="en-US" dirty="0" smtClean="0"/>
-              <a:t>DC Motor</a:t>
+              <a:t>Example: Reading And Writing</a:t>
             </a:r>
             <a:endParaRPr lang="en-US" dirty="0"/>
           </a:p>
@@ -7282,7 +7738,11 @@
           <a:bodyPr/>
           <a:lstStyle/>
           <a:p>
-            <a:endParaRPr lang="en-US"/>
+            <a:r>
+              <a:rPr lang="en-US" dirty="0" smtClean="0"/>
+              <a:t>3.2</a:t>
+            </a:r>
+            <a:endParaRPr lang="en-US" dirty="0"/>
           </a:p>
         </p:txBody>
       </p:sp>
@@ -7329,10 +7789,40 @@
           </a:p>
         </p:txBody>
       </p:sp>
+      <p:pic>
+        <p:nvPicPr>
+          <p:cNvPr id="6" name="Picture 5"/>
+          <p:cNvPicPr>
+            <a:picLocks noChangeAspect="1"/>
+          </p:cNvPicPr>
+          <p:nvPr/>
+        </p:nvPicPr>
+        <p:blipFill>
+          <a:blip r:embed="rId2">
+            <a:extLst>
+              <a:ext uri="{28A0092B-C50C-407E-A947-70E740481C1C}">
+                <a14:useLocalDpi xmlns:a14="http://schemas.microsoft.com/office/drawing/2010/main" val="0"/>
+              </a:ext>
+            </a:extLst>
+          </a:blip>
+          <a:stretch>
+            <a:fillRect/>
+          </a:stretch>
+        </p:blipFill>
+        <p:spPr>
+          <a:xfrm>
+            <a:off x="2265691" y="114300"/>
+            <a:ext cx="4339624" cy="5143500"/>
+          </a:xfrm>
+          <a:prstGeom prst="rect">
+            <a:avLst/>
+          </a:prstGeom>
+        </p:spPr>
+      </p:pic>
     </p:spTree>
     <p:extLst>
       <p:ext uri="{BB962C8B-B14F-4D97-AF65-F5344CB8AC3E}">
-        <p14:creationId xmlns:p14="http://schemas.microsoft.com/office/powerpoint/2010/main" val="875966053"/>
+        <p14:creationId xmlns:p14="http://schemas.microsoft.com/office/powerpoint/2010/main" val="1580335747"/>
       </p:ext>
     </p:extLst>
   </p:cSld>
@@ -7376,7 +7866,7 @@
           <a:p>
             <a:r>
               <a:rPr lang="en-US" dirty="0" smtClean="0"/>
-              <a:t>Example: Motor Velocity</a:t>
+              <a:t>Example: Reading And Writing</a:t>
             </a:r>
             <a:endParaRPr lang="en-US" dirty="0"/>
           </a:p>
@@ -7397,7 +7887,11 @@
           <a:bodyPr/>
           <a:lstStyle/>
           <a:p>
-            <a:endParaRPr lang="en-US"/>
+            <a:r>
+              <a:rPr lang="en-US" dirty="0" smtClean="0"/>
+              <a:t>3.3</a:t>
+            </a:r>
+            <a:endParaRPr lang="en-US" dirty="0"/>
           </a:p>
         </p:txBody>
       </p:sp>
@@ -7444,10 +7938,40 @@
           </a:p>
         </p:txBody>
       </p:sp>
+      <p:pic>
+        <p:nvPicPr>
+          <p:cNvPr id="7" name="Picture 6"/>
+          <p:cNvPicPr>
+            <a:picLocks noChangeAspect="1"/>
+          </p:cNvPicPr>
+          <p:nvPr/>
+        </p:nvPicPr>
+        <p:blipFill>
+          <a:blip r:embed="rId2">
+            <a:extLst>
+              <a:ext uri="{28A0092B-C50C-407E-A947-70E740481C1C}">
+                <a14:useLocalDpi xmlns:a14="http://schemas.microsoft.com/office/drawing/2010/main" val="0"/>
+              </a:ext>
+            </a:extLst>
+          </a:blip>
+          <a:stretch>
+            <a:fillRect/>
+          </a:stretch>
+        </p:blipFill>
+        <p:spPr>
+          <a:xfrm>
+            <a:off x="2077971" y="-50"/>
+            <a:ext cx="4339624" cy="5143500"/>
+          </a:xfrm>
+          <a:prstGeom prst="rect">
+            <a:avLst/>
+          </a:prstGeom>
+        </p:spPr>
+      </p:pic>
     </p:spTree>
     <p:extLst>
       <p:ext uri="{BB962C8B-B14F-4D97-AF65-F5344CB8AC3E}">
-        <p14:creationId xmlns:p14="http://schemas.microsoft.com/office/powerpoint/2010/main" val="741603320"/>
+        <p14:creationId xmlns:p14="http://schemas.microsoft.com/office/powerpoint/2010/main" val="2017606760"/>
       </p:ext>
     </p:extLst>
   </p:cSld>
@@ -7491,7 +8015,7 @@
           <a:p>
             <a:r>
               <a:rPr lang="en-US" dirty="0" smtClean="0"/>
-              <a:t>Control </a:t>
+              <a:t>Example: Reading And Writing</a:t>
             </a:r>
             <a:endParaRPr lang="en-US" dirty="0"/>
           </a:p>
@@ -7512,7 +8036,11 @@
           <a:bodyPr/>
           <a:lstStyle/>
           <a:p>
-            <a:endParaRPr lang="en-US"/>
+            <a:r>
+              <a:rPr lang="en-US" dirty="0" smtClean="0"/>
+              <a:t>3.4</a:t>
+            </a:r>
+            <a:endParaRPr lang="en-US" dirty="0"/>
           </a:p>
         </p:txBody>
       </p:sp>
@@ -7559,10 +8087,40 @@
           </a:p>
         </p:txBody>
       </p:sp>
+      <p:pic>
+        <p:nvPicPr>
+          <p:cNvPr id="7" name="Picture 6"/>
+          <p:cNvPicPr>
+            <a:picLocks noChangeAspect="1"/>
+          </p:cNvPicPr>
+          <p:nvPr/>
+        </p:nvPicPr>
+        <p:blipFill>
+          <a:blip r:embed="rId2">
+            <a:extLst>
+              <a:ext uri="{28A0092B-C50C-407E-A947-70E740481C1C}">
+                <a14:useLocalDpi xmlns:a14="http://schemas.microsoft.com/office/drawing/2010/main" val="0"/>
+              </a:ext>
+            </a:extLst>
+          </a:blip>
+          <a:stretch>
+            <a:fillRect/>
+          </a:stretch>
+        </p:blipFill>
+        <p:spPr>
+          <a:xfrm>
+            <a:off x="2077971" y="-50"/>
+            <a:ext cx="4339624" cy="5143500"/>
+          </a:xfrm>
+          <a:prstGeom prst="rect">
+            <a:avLst/>
+          </a:prstGeom>
+        </p:spPr>
+      </p:pic>
     </p:spTree>
     <p:extLst>
       <p:ext uri="{BB962C8B-B14F-4D97-AF65-F5344CB8AC3E}">
-        <p14:creationId xmlns:p14="http://schemas.microsoft.com/office/powerpoint/2010/main" val="441764910"/>
+        <p14:creationId xmlns:p14="http://schemas.microsoft.com/office/powerpoint/2010/main" val="1326843096"/>
       </p:ext>
     </p:extLst>
   </p:cSld>
@@ -7809,30 +8367,30 @@
           <a:bodyPr/>
           <a:lstStyle/>
           <a:p>
+            <a:endParaRPr lang="en-US" dirty="0"/>
+          </a:p>
+        </p:txBody>
+      </p:sp>
+      <p:sp>
+        <p:nvSpPr>
+          <p:cNvPr id="3" name="Text Placeholder 2"/>
+          <p:cNvSpPr>
+            <a:spLocks noGrp="1"/>
+          </p:cNvSpPr>
+          <p:nvPr>
+            <p:ph type="body" idx="1"/>
+          </p:nvPr>
+        </p:nvSpPr>
+        <p:spPr/>
+        <p:txBody>
+          <a:bodyPr/>
+          <a:lstStyle/>
+          <a:p>
             <a:r>
               <a:rPr lang="en-US" dirty="0" smtClean="0"/>
-              <a:t>PD Controller </a:t>
+              <a:t>3.5</a:t>
             </a:r>
             <a:endParaRPr lang="en-US" dirty="0"/>
-          </a:p>
-        </p:txBody>
-      </p:sp>
-      <p:sp>
-        <p:nvSpPr>
-          <p:cNvPr id="3" name="Text Placeholder 2"/>
-          <p:cNvSpPr>
-            <a:spLocks noGrp="1"/>
-          </p:cNvSpPr>
-          <p:nvPr>
-            <p:ph type="body" idx="1"/>
-          </p:nvPr>
-        </p:nvSpPr>
-        <p:spPr/>
-        <p:txBody>
-          <a:bodyPr/>
-          <a:lstStyle/>
-          <a:p>
-            <a:endParaRPr lang="en-US"/>
           </a:p>
         </p:txBody>
       </p:sp>
@@ -7879,10 +8437,96 @@
           </a:p>
         </p:txBody>
       </p:sp>
+      <p:grpSp>
+        <p:nvGrpSpPr>
+          <p:cNvPr id="8" name="Group 7"/>
+          <p:cNvGrpSpPr/>
+          <p:nvPr/>
+        </p:nvGrpSpPr>
+        <p:grpSpPr>
+          <a:xfrm>
+            <a:off x="3559389" y="982555"/>
+            <a:ext cx="3045926" cy="3752531"/>
+            <a:chOff x="0" y="762000"/>
+            <a:chExt cx="4520053" cy="5568631"/>
+          </a:xfrm>
+        </p:grpSpPr>
+        <p:pic>
+          <p:nvPicPr>
+            <p:cNvPr id="7" name="Picture 6"/>
+            <p:cNvPicPr>
+              <a:picLocks noChangeAspect="1"/>
+            </p:cNvPicPr>
+            <p:nvPr/>
+          </p:nvPicPr>
+          <p:blipFill>
+            <a:blip r:embed="rId2">
+              <a:extLst>
+                <a:ext uri="{28A0092B-C50C-407E-A947-70E740481C1C}">
+                  <a14:useLocalDpi xmlns:a14="http://schemas.microsoft.com/office/drawing/2010/main" val="0"/>
+                </a:ext>
+              </a:extLst>
+            </a:blip>
+            <a:stretch>
+              <a:fillRect/>
+            </a:stretch>
+          </p:blipFill>
+          <p:spPr>
+            <a:xfrm>
+              <a:off x="0" y="1187131"/>
+              <a:ext cx="4339624" cy="5143500"/>
+            </a:xfrm>
+            <a:prstGeom prst="rect">
+              <a:avLst/>
+            </a:prstGeom>
+          </p:spPr>
+        </p:pic>
+        <p:pic>
+          <p:nvPicPr>
+            <p:cNvPr id="3074" name="Picture 2" descr="http://www.mikemitterer.at/uploads/pics/svg.breadboard.Multimeter.fzp_e0716245ec4d4a82ac72f7254bb3b6a9_2_breadboard.png"/>
+            <p:cNvPicPr>
+              <a:picLocks noChangeAspect="1" noChangeArrowheads="1"/>
+            </p:cNvPicPr>
+            <p:nvPr/>
+          </p:nvPicPr>
+          <p:blipFill>
+            <a:blip r:embed="rId3">
+              <a:extLst>
+                <a:ext uri="{28A0092B-C50C-407E-A947-70E740481C1C}">
+                  <a14:useLocalDpi xmlns:a14="http://schemas.microsoft.com/office/drawing/2010/main" val="0"/>
+                </a:ext>
+              </a:extLst>
+            </a:blip>
+            <a:srcRect/>
+            <a:stretch>
+              <a:fillRect/>
+            </a:stretch>
+          </p:blipFill>
+          <p:spPr bwMode="auto">
+            <a:xfrm flipH="1">
+              <a:off x="2747604" y="762000"/>
+              <a:ext cx="1772449" cy="1646345"/>
+            </a:xfrm>
+            <a:prstGeom prst="rect">
+              <a:avLst/>
+            </a:prstGeom>
+            <a:noFill/>
+            <a:extLst>
+              <a:ext uri="{909E8E84-426E-40DD-AFC4-6F175D3DCCD1}">
+                <a14:hiddenFill xmlns:a14="http://schemas.microsoft.com/office/drawing/2010/main">
+                  <a:solidFill>
+                    <a:srgbClr val="FFFFFF"/>
+                  </a:solidFill>
+                </a14:hiddenFill>
+              </a:ext>
+            </a:extLst>
+          </p:spPr>
+        </p:pic>
+      </p:grpSp>
     </p:spTree>
     <p:extLst>
       <p:ext uri="{BB962C8B-B14F-4D97-AF65-F5344CB8AC3E}">
-        <p14:creationId xmlns:p14="http://schemas.microsoft.com/office/powerpoint/2010/main" val="12325674"/>
+        <p14:creationId xmlns:p14="http://schemas.microsoft.com/office/powerpoint/2010/main" val="2937023175"/>
       </p:ext>
     </p:extLst>
   </p:cSld>
@@ -7924,34 +8568,30 @@
           <a:bodyPr/>
           <a:lstStyle/>
           <a:p>
-            <a:r>
-              <a:rPr lang="en-US" dirty="0" err="1" smtClean="0"/>
-              <a:t>Hapkit</a:t>
-            </a:r>
+            <a:endParaRPr lang="en-US" dirty="0"/>
+          </a:p>
+        </p:txBody>
+      </p:sp>
+      <p:sp>
+        <p:nvSpPr>
+          <p:cNvPr id="3" name="Text Placeholder 2"/>
+          <p:cNvSpPr>
+            <a:spLocks noGrp="1"/>
+          </p:cNvSpPr>
+          <p:nvPr>
+            <p:ph type="body" idx="1"/>
+          </p:nvPr>
+        </p:nvSpPr>
+        <p:spPr/>
+        <p:txBody>
+          <a:bodyPr/>
+          <a:lstStyle/>
+          <a:p>
             <a:r>
               <a:rPr lang="en-US" dirty="0" smtClean="0"/>
-              <a:t> sketch</a:t>
+              <a:t>3.6</a:t>
             </a:r>
             <a:endParaRPr lang="en-US" dirty="0"/>
-          </a:p>
-        </p:txBody>
-      </p:sp>
-      <p:sp>
-        <p:nvSpPr>
-          <p:cNvPr id="3" name="Text Placeholder 2"/>
-          <p:cNvSpPr>
-            <a:spLocks noGrp="1"/>
-          </p:cNvSpPr>
-          <p:nvPr>
-            <p:ph type="body" idx="1"/>
-          </p:nvPr>
-        </p:nvSpPr>
-        <p:spPr/>
-        <p:txBody>
-          <a:bodyPr/>
-          <a:lstStyle/>
-          <a:p>
-            <a:endParaRPr lang="en-US"/>
           </a:p>
         </p:txBody>
       </p:sp>
@@ -7998,10 +8638,40 @@
           </a:p>
         </p:txBody>
       </p:sp>
+      <p:pic>
+        <p:nvPicPr>
+          <p:cNvPr id="9" name="Picture 8"/>
+          <p:cNvPicPr>
+            <a:picLocks noChangeAspect="1"/>
+          </p:cNvPicPr>
+          <p:nvPr/>
+        </p:nvPicPr>
+        <p:blipFill>
+          <a:blip r:embed="rId2">
+            <a:extLst>
+              <a:ext uri="{28A0092B-C50C-407E-A947-70E740481C1C}">
+                <a14:useLocalDpi xmlns:a14="http://schemas.microsoft.com/office/drawing/2010/main" val="0"/>
+              </a:ext>
+            </a:extLst>
+          </a:blip>
+          <a:stretch>
+            <a:fillRect/>
+          </a:stretch>
+        </p:blipFill>
+        <p:spPr>
+          <a:xfrm>
+            <a:off x="3609049" y="1343601"/>
+            <a:ext cx="2816188" cy="3337862"/>
+          </a:xfrm>
+          <a:prstGeom prst="rect">
+            <a:avLst/>
+          </a:prstGeom>
+        </p:spPr>
+      </p:pic>
     </p:spTree>
     <p:extLst>
       <p:ext uri="{BB962C8B-B14F-4D97-AF65-F5344CB8AC3E}">
-        <p14:creationId xmlns:p14="http://schemas.microsoft.com/office/powerpoint/2010/main" val="627326719"/>
+        <p14:creationId xmlns:p14="http://schemas.microsoft.com/office/powerpoint/2010/main" val="3444615826"/>
       </p:ext>
     </p:extLst>
   </p:cSld>
@@ -8045,7 +8715,15 @@
           <a:p>
             <a:r>
               <a:rPr lang="en-US" dirty="0" smtClean="0"/>
-              <a:t>3D Printing and Homework</a:t>
+              <a:t>Motivation: Domo </a:t>
+            </a:r>
+            <a:r>
+              <a:rPr lang="en-US" dirty="0" err="1" smtClean="0"/>
+              <a:t>Arigoto</a:t>
+            </a:r>
+            <a:r>
+              <a:rPr lang="en-US" dirty="0" smtClean="0"/>
+              <a:t> </a:t>
             </a:r>
             <a:endParaRPr lang="en-US" dirty="0"/>
           </a:p>
@@ -8116,7 +8794,822 @@
     </p:spTree>
     <p:extLst>
       <p:ext uri="{BB962C8B-B14F-4D97-AF65-F5344CB8AC3E}">
-        <p14:creationId xmlns:p14="http://schemas.microsoft.com/office/powerpoint/2010/main" val="2453752899"/>
+        <p14:creationId xmlns:p14="http://schemas.microsoft.com/office/powerpoint/2010/main" val="3214018131"/>
+      </p:ext>
+    </p:extLst>
+  </p:cSld>
+  <p:clrMapOvr>
+    <a:masterClrMapping/>
+  </p:clrMapOvr>
+</p:sld>
+</file>
+
+<file path=ppt/slides/slide43.xml><?xml version="1.0" encoding="utf-8"?>
+<p:sld xmlns:a="http://schemas.openxmlformats.org/drawingml/2006/main" xmlns:r="http://schemas.openxmlformats.org/officeDocument/2006/relationships" xmlns:p="http://schemas.openxmlformats.org/presentationml/2006/main">
+  <p:cSld>
+    <p:spTree>
+      <p:nvGrpSpPr>
+        <p:cNvPr id="1" name=""/>
+        <p:cNvGrpSpPr/>
+        <p:nvPr/>
+      </p:nvGrpSpPr>
+      <p:grpSpPr>
+        <a:xfrm>
+          <a:off x="0" y="0"/>
+          <a:ext cx="0" cy="0"/>
+          <a:chOff x="0" y="0"/>
+          <a:chExt cx="0" cy="0"/>
+        </a:xfrm>
+      </p:grpSpPr>
+      <p:sp>
+        <p:nvSpPr>
+          <p:cNvPr id="2" name="Title 1"/>
+          <p:cNvSpPr>
+            <a:spLocks noGrp="1"/>
+          </p:cNvSpPr>
+          <p:nvPr>
+            <p:ph type="title"/>
+          </p:nvPr>
+        </p:nvSpPr>
+        <p:spPr/>
+        <p:txBody>
+          <a:bodyPr/>
+          <a:lstStyle/>
+          <a:p>
+            <a:r>
+              <a:rPr lang="en-US" dirty="0" smtClean="0"/>
+              <a:t>Sensing</a:t>
+            </a:r>
+            <a:endParaRPr lang="en-US" dirty="0"/>
+          </a:p>
+        </p:txBody>
+      </p:sp>
+      <p:sp>
+        <p:nvSpPr>
+          <p:cNvPr id="3" name="Text Placeholder 2"/>
+          <p:cNvSpPr>
+            <a:spLocks noGrp="1"/>
+          </p:cNvSpPr>
+          <p:nvPr>
+            <p:ph type="body" idx="1"/>
+          </p:nvPr>
+        </p:nvSpPr>
+        <p:spPr/>
+        <p:txBody>
+          <a:bodyPr/>
+          <a:lstStyle/>
+          <a:p>
+            <a:endParaRPr lang="en-US" dirty="0"/>
+          </a:p>
+        </p:txBody>
+      </p:sp>
+      <p:sp>
+        <p:nvSpPr>
+          <p:cNvPr id="4" name="Text Placeholder 3"/>
+          <p:cNvSpPr>
+            <a:spLocks noGrp="1"/>
+          </p:cNvSpPr>
+          <p:nvPr>
+            <p:ph type="body" idx="2"/>
+          </p:nvPr>
+        </p:nvSpPr>
+        <p:spPr/>
+        <p:txBody>
+          <a:bodyPr/>
+          <a:lstStyle/>
+          <a:p>
+            <a:endParaRPr lang="en-US"/>
+          </a:p>
+        </p:txBody>
+      </p:sp>
+      <p:sp>
+        <p:nvSpPr>
+          <p:cNvPr id="5" name="Slide Number Placeholder 4"/>
+          <p:cNvSpPr>
+            <a:spLocks noGrp="1"/>
+          </p:cNvSpPr>
+          <p:nvPr>
+            <p:ph type="sldNum" idx="12"/>
+          </p:nvPr>
+        </p:nvSpPr>
+        <p:spPr/>
+        <p:txBody>
+          <a:bodyPr/>
+          <a:lstStyle/>
+          <a:p>
+            <a:fld id="{00000000-1234-1234-1234-123412341234}" type="slidenum">
+              <a:rPr lang="en" smtClean="0"/>
+              <a:pPr/>
+              <a:t>43</a:t>
+            </a:fld>
+            <a:endParaRPr lang="en"/>
+          </a:p>
+        </p:txBody>
+      </p:sp>
+    </p:spTree>
+    <p:extLst>
+      <p:ext uri="{BB962C8B-B14F-4D97-AF65-F5344CB8AC3E}">
+        <p14:creationId xmlns:p14="http://schemas.microsoft.com/office/powerpoint/2010/main" val="38753212"/>
+      </p:ext>
+    </p:extLst>
+  </p:cSld>
+  <p:clrMapOvr>
+    <a:masterClrMapping/>
+  </p:clrMapOvr>
+</p:sld>
+</file>
+
+<file path=ppt/slides/slide44.xml><?xml version="1.0" encoding="utf-8"?>
+<p:sld xmlns:a="http://schemas.openxmlformats.org/drawingml/2006/main" xmlns:r="http://schemas.openxmlformats.org/officeDocument/2006/relationships" xmlns:p="http://schemas.openxmlformats.org/presentationml/2006/main">
+  <p:cSld>
+    <p:spTree>
+      <p:nvGrpSpPr>
+        <p:cNvPr id="1" name=""/>
+        <p:cNvGrpSpPr/>
+        <p:nvPr/>
+      </p:nvGrpSpPr>
+      <p:grpSpPr>
+        <a:xfrm>
+          <a:off x="0" y="0"/>
+          <a:ext cx="0" cy="0"/>
+          <a:chOff x="0" y="0"/>
+          <a:chExt cx="0" cy="0"/>
+        </a:xfrm>
+      </p:grpSpPr>
+      <p:sp>
+        <p:nvSpPr>
+          <p:cNvPr id="2" name="Title 1"/>
+          <p:cNvSpPr>
+            <a:spLocks noGrp="1"/>
+          </p:cNvSpPr>
+          <p:nvPr>
+            <p:ph type="title"/>
+          </p:nvPr>
+        </p:nvSpPr>
+        <p:spPr/>
+        <p:txBody>
+          <a:bodyPr/>
+          <a:lstStyle/>
+          <a:p>
+            <a:r>
+              <a:rPr lang="en-US" dirty="0" smtClean="0"/>
+              <a:t>Encoders</a:t>
+            </a:r>
+            <a:endParaRPr lang="en-US" dirty="0"/>
+          </a:p>
+        </p:txBody>
+      </p:sp>
+      <p:sp>
+        <p:nvSpPr>
+          <p:cNvPr id="3" name="Text Placeholder 2"/>
+          <p:cNvSpPr>
+            <a:spLocks noGrp="1"/>
+          </p:cNvSpPr>
+          <p:nvPr>
+            <p:ph type="body" idx="1"/>
+          </p:nvPr>
+        </p:nvSpPr>
+        <p:spPr/>
+        <p:txBody>
+          <a:bodyPr/>
+          <a:lstStyle/>
+          <a:p>
+            <a:endParaRPr lang="en-US"/>
+          </a:p>
+        </p:txBody>
+      </p:sp>
+      <p:sp>
+        <p:nvSpPr>
+          <p:cNvPr id="4" name="Text Placeholder 3"/>
+          <p:cNvSpPr>
+            <a:spLocks noGrp="1"/>
+          </p:cNvSpPr>
+          <p:nvPr>
+            <p:ph type="body" idx="2"/>
+          </p:nvPr>
+        </p:nvSpPr>
+        <p:spPr/>
+        <p:txBody>
+          <a:bodyPr/>
+          <a:lstStyle/>
+          <a:p>
+            <a:endParaRPr lang="en-US"/>
+          </a:p>
+        </p:txBody>
+      </p:sp>
+      <p:sp>
+        <p:nvSpPr>
+          <p:cNvPr id="5" name="Slide Number Placeholder 4"/>
+          <p:cNvSpPr>
+            <a:spLocks noGrp="1"/>
+          </p:cNvSpPr>
+          <p:nvPr>
+            <p:ph type="sldNum" idx="12"/>
+          </p:nvPr>
+        </p:nvSpPr>
+        <p:spPr/>
+        <p:txBody>
+          <a:bodyPr/>
+          <a:lstStyle/>
+          <a:p>
+            <a:fld id="{00000000-1234-1234-1234-123412341234}" type="slidenum">
+              <a:rPr lang="en" smtClean="0"/>
+              <a:pPr/>
+              <a:t>44</a:t>
+            </a:fld>
+            <a:endParaRPr lang="en"/>
+          </a:p>
+        </p:txBody>
+      </p:sp>
+    </p:spTree>
+    <p:extLst>
+      <p:ext uri="{BB962C8B-B14F-4D97-AF65-F5344CB8AC3E}">
+        <p14:creationId xmlns:p14="http://schemas.microsoft.com/office/powerpoint/2010/main" val="1802192246"/>
+      </p:ext>
+    </p:extLst>
+  </p:cSld>
+  <p:clrMapOvr>
+    <a:masterClrMapping/>
+  </p:clrMapOvr>
+</p:sld>
+</file>
+
+<file path=ppt/slides/slide45.xml><?xml version="1.0" encoding="utf-8"?>
+<p:sld xmlns:a="http://schemas.openxmlformats.org/drawingml/2006/main" xmlns:r="http://schemas.openxmlformats.org/officeDocument/2006/relationships" xmlns:p="http://schemas.openxmlformats.org/presentationml/2006/main">
+  <p:cSld>
+    <p:spTree>
+      <p:nvGrpSpPr>
+        <p:cNvPr id="1" name=""/>
+        <p:cNvGrpSpPr/>
+        <p:nvPr/>
+      </p:nvGrpSpPr>
+      <p:grpSpPr>
+        <a:xfrm>
+          <a:off x="0" y="0"/>
+          <a:ext cx="0" cy="0"/>
+          <a:chOff x="0" y="0"/>
+          <a:chExt cx="0" cy="0"/>
+        </a:xfrm>
+      </p:grpSpPr>
+      <p:sp>
+        <p:nvSpPr>
+          <p:cNvPr id="2" name="Title 1"/>
+          <p:cNvSpPr>
+            <a:spLocks noGrp="1"/>
+          </p:cNvSpPr>
+          <p:nvPr>
+            <p:ph type="title"/>
+          </p:nvPr>
+        </p:nvSpPr>
+        <p:spPr/>
+        <p:txBody>
+          <a:bodyPr/>
+          <a:lstStyle/>
+          <a:p>
+            <a:r>
+              <a:rPr lang="en-US" dirty="0" smtClean="0"/>
+              <a:t>Example: Reading Positions</a:t>
+            </a:r>
+            <a:endParaRPr lang="en-US" dirty="0"/>
+          </a:p>
+        </p:txBody>
+      </p:sp>
+      <p:sp>
+        <p:nvSpPr>
+          <p:cNvPr id="3" name="Text Placeholder 2"/>
+          <p:cNvSpPr>
+            <a:spLocks noGrp="1"/>
+          </p:cNvSpPr>
+          <p:nvPr>
+            <p:ph type="body" idx="1"/>
+          </p:nvPr>
+        </p:nvSpPr>
+        <p:spPr/>
+        <p:txBody>
+          <a:bodyPr/>
+          <a:lstStyle/>
+          <a:p>
+            <a:r>
+              <a:rPr lang="en-US" dirty="0"/>
+              <a:t>4.0</a:t>
+            </a:r>
+          </a:p>
+          <a:p>
+            <a:endParaRPr lang="en-US" dirty="0"/>
+          </a:p>
+        </p:txBody>
+      </p:sp>
+      <p:sp>
+        <p:nvSpPr>
+          <p:cNvPr id="4" name="Text Placeholder 3"/>
+          <p:cNvSpPr>
+            <a:spLocks noGrp="1"/>
+          </p:cNvSpPr>
+          <p:nvPr>
+            <p:ph type="body" idx="2"/>
+          </p:nvPr>
+        </p:nvSpPr>
+        <p:spPr/>
+        <p:txBody>
+          <a:bodyPr/>
+          <a:lstStyle/>
+          <a:p>
+            <a:endParaRPr lang="en-US"/>
+          </a:p>
+        </p:txBody>
+      </p:sp>
+      <p:sp>
+        <p:nvSpPr>
+          <p:cNvPr id="5" name="Slide Number Placeholder 4"/>
+          <p:cNvSpPr>
+            <a:spLocks noGrp="1"/>
+          </p:cNvSpPr>
+          <p:nvPr>
+            <p:ph type="sldNum" idx="12"/>
+          </p:nvPr>
+        </p:nvSpPr>
+        <p:spPr/>
+        <p:txBody>
+          <a:bodyPr/>
+          <a:lstStyle/>
+          <a:p>
+            <a:fld id="{00000000-1234-1234-1234-123412341234}" type="slidenum">
+              <a:rPr lang="en" smtClean="0"/>
+              <a:pPr/>
+              <a:t>45</a:t>
+            </a:fld>
+            <a:endParaRPr lang="en"/>
+          </a:p>
+        </p:txBody>
+      </p:sp>
+    </p:spTree>
+    <p:extLst>
+      <p:ext uri="{BB962C8B-B14F-4D97-AF65-F5344CB8AC3E}">
+        <p14:creationId xmlns:p14="http://schemas.microsoft.com/office/powerpoint/2010/main" val="660564970"/>
+      </p:ext>
+    </p:extLst>
+  </p:cSld>
+  <p:clrMapOvr>
+    <a:masterClrMapping/>
+  </p:clrMapOvr>
+</p:sld>
+</file>
+
+<file path=ppt/slides/slide46.xml><?xml version="1.0" encoding="utf-8"?>
+<p:sld xmlns:a="http://schemas.openxmlformats.org/drawingml/2006/main" xmlns:r="http://schemas.openxmlformats.org/officeDocument/2006/relationships" xmlns:p="http://schemas.openxmlformats.org/presentationml/2006/main">
+  <p:cSld>
+    <p:spTree>
+      <p:nvGrpSpPr>
+        <p:cNvPr id="1" name=""/>
+        <p:cNvGrpSpPr/>
+        <p:nvPr/>
+      </p:nvGrpSpPr>
+      <p:grpSpPr>
+        <a:xfrm>
+          <a:off x="0" y="0"/>
+          <a:ext cx="0" cy="0"/>
+          <a:chOff x="0" y="0"/>
+          <a:chExt cx="0" cy="0"/>
+        </a:xfrm>
+      </p:grpSpPr>
+      <p:sp>
+        <p:nvSpPr>
+          <p:cNvPr id="2" name="Title 1"/>
+          <p:cNvSpPr>
+            <a:spLocks noGrp="1"/>
+          </p:cNvSpPr>
+          <p:nvPr>
+            <p:ph type="title"/>
+          </p:nvPr>
+        </p:nvSpPr>
+        <p:spPr/>
+        <p:txBody>
+          <a:bodyPr/>
+          <a:lstStyle/>
+          <a:p>
+            <a:r>
+              <a:rPr lang="en-US" dirty="0" smtClean="0"/>
+              <a:t>Actuation</a:t>
+            </a:r>
+            <a:endParaRPr lang="en-US" dirty="0"/>
+          </a:p>
+        </p:txBody>
+      </p:sp>
+      <p:sp>
+        <p:nvSpPr>
+          <p:cNvPr id="3" name="Text Placeholder 2"/>
+          <p:cNvSpPr>
+            <a:spLocks noGrp="1"/>
+          </p:cNvSpPr>
+          <p:nvPr>
+            <p:ph type="body" idx="1"/>
+          </p:nvPr>
+        </p:nvSpPr>
+        <p:spPr/>
+        <p:txBody>
+          <a:bodyPr/>
+          <a:lstStyle/>
+          <a:p>
+            <a:endParaRPr lang="en-US"/>
+          </a:p>
+        </p:txBody>
+      </p:sp>
+      <p:sp>
+        <p:nvSpPr>
+          <p:cNvPr id="4" name="Text Placeholder 3"/>
+          <p:cNvSpPr>
+            <a:spLocks noGrp="1"/>
+          </p:cNvSpPr>
+          <p:nvPr>
+            <p:ph type="body" idx="2"/>
+          </p:nvPr>
+        </p:nvSpPr>
+        <p:spPr/>
+        <p:txBody>
+          <a:bodyPr/>
+          <a:lstStyle/>
+          <a:p>
+            <a:endParaRPr lang="en-US"/>
+          </a:p>
+        </p:txBody>
+      </p:sp>
+      <p:sp>
+        <p:nvSpPr>
+          <p:cNvPr id="5" name="Slide Number Placeholder 4"/>
+          <p:cNvSpPr>
+            <a:spLocks noGrp="1"/>
+          </p:cNvSpPr>
+          <p:nvPr>
+            <p:ph type="sldNum" idx="12"/>
+          </p:nvPr>
+        </p:nvSpPr>
+        <p:spPr/>
+        <p:txBody>
+          <a:bodyPr/>
+          <a:lstStyle/>
+          <a:p>
+            <a:fld id="{00000000-1234-1234-1234-123412341234}" type="slidenum">
+              <a:rPr lang="en" smtClean="0"/>
+              <a:pPr/>
+              <a:t>46</a:t>
+            </a:fld>
+            <a:endParaRPr lang="en"/>
+          </a:p>
+        </p:txBody>
+      </p:sp>
+    </p:spTree>
+    <p:extLst>
+      <p:ext uri="{BB962C8B-B14F-4D97-AF65-F5344CB8AC3E}">
+        <p14:creationId xmlns:p14="http://schemas.microsoft.com/office/powerpoint/2010/main" val="846365663"/>
+      </p:ext>
+    </p:extLst>
+  </p:cSld>
+  <p:clrMapOvr>
+    <a:masterClrMapping/>
+  </p:clrMapOvr>
+</p:sld>
+</file>
+
+<file path=ppt/slides/slide47.xml><?xml version="1.0" encoding="utf-8"?>
+<p:sld xmlns:a="http://schemas.openxmlformats.org/drawingml/2006/main" xmlns:r="http://schemas.openxmlformats.org/officeDocument/2006/relationships" xmlns:p="http://schemas.openxmlformats.org/presentationml/2006/main">
+  <p:cSld>
+    <p:spTree>
+      <p:nvGrpSpPr>
+        <p:cNvPr id="1" name=""/>
+        <p:cNvGrpSpPr/>
+        <p:nvPr/>
+      </p:nvGrpSpPr>
+      <p:grpSpPr>
+        <a:xfrm>
+          <a:off x="0" y="0"/>
+          <a:ext cx="0" cy="0"/>
+          <a:chOff x="0" y="0"/>
+          <a:chExt cx="0" cy="0"/>
+        </a:xfrm>
+      </p:grpSpPr>
+      <p:sp>
+        <p:nvSpPr>
+          <p:cNvPr id="2" name="Title 1"/>
+          <p:cNvSpPr>
+            <a:spLocks noGrp="1"/>
+          </p:cNvSpPr>
+          <p:nvPr>
+            <p:ph type="title"/>
+          </p:nvPr>
+        </p:nvSpPr>
+        <p:spPr/>
+        <p:txBody>
+          <a:bodyPr/>
+          <a:lstStyle/>
+          <a:p>
+            <a:r>
+              <a:rPr lang="en-US" dirty="0" smtClean="0"/>
+              <a:t>DC Motor</a:t>
+            </a:r>
+            <a:endParaRPr lang="en-US" dirty="0"/>
+          </a:p>
+        </p:txBody>
+      </p:sp>
+      <p:sp>
+        <p:nvSpPr>
+          <p:cNvPr id="3" name="Text Placeholder 2"/>
+          <p:cNvSpPr>
+            <a:spLocks noGrp="1"/>
+          </p:cNvSpPr>
+          <p:nvPr>
+            <p:ph type="body" idx="1"/>
+          </p:nvPr>
+        </p:nvSpPr>
+        <p:spPr/>
+        <p:txBody>
+          <a:bodyPr/>
+          <a:lstStyle/>
+          <a:p>
+            <a:endParaRPr lang="en-US"/>
+          </a:p>
+        </p:txBody>
+      </p:sp>
+      <p:sp>
+        <p:nvSpPr>
+          <p:cNvPr id="4" name="Text Placeholder 3"/>
+          <p:cNvSpPr>
+            <a:spLocks noGrp="1"/>
+          </p:cNvSpPr>
+          <p:nvPr>
+            <p:ph type="body" idx="2"/>
+          </p:nvPr>
+        </p:nvSpPr>
+        <p:spPr/>
+        <p:txBody>
+          <a:bodyPr/>
+          <a:lstStyle/>
+          <a:p>
+            <a:endParaRPr lang="en-US"/>
+          </a:p>
+        </p:txBody>
+      </p:sp>
+      <p:sp>
+        <p:nvSpPr>
+          <p:cNvPr id="5" name="Slide Number Placeholder 4"/>
+          <p:cNvSpPr>
+            <a:spLocks noGrp="1"/>
+          </p:cNvSpPr>
+          <p:nvPr>
+            <p:ph type="sldNum" idx="12"/>
+          </p:nvPr>
+        </p:nvSpPr>
+        <p:spPr/>
+        <p:txBody>
+          <a:bodyPr/>
+          <a:lstStyle/>
+          <a:p>
+            <a:fld id="{00000000-1234-1234-1234-123412341234}" type="slidenum">
+              <a:rPr lang="en" smtClean="0"/>
+              <a:pPr/>
+              <a:t>47</a:t>
+            </a:fld>
+            <a:endParaRPr lang="en"/>
+          </a:p>
+        </p:txBody>
+      </p:sp>
+    </p:spTree>
+    <p:extLst>
+      <p:ext uri="{BB962C8B-B14F-4D97-AF65-F5344CB8AC3E}">
+        <p14:creationId xmlns:p14="http://schemas.microsoft.com/office/powerpoint/2010/main" val="875966053"/>
+      </p:ext>
+    </p:extLst>
+  </p:cSld>
+  <p:clrMapOvr>
+    <a:masterClrMapping/>
+  </p:clrMapOvr>
+</p:sld>
+</file>
+
+<file path=ppt/slides/slide48.xml><?xml version="1.0" encoding="utf-8"?>
+<p:sld xmlns:a="http://schemas.openxmlformats.org/drawingml/2006/main" xmlns:r="http://schemas.openxmlformats.org/officeDocument/2006/relationships" xmlns:p="http://schemas.openxmlformats.org/presentationml/2006/main">
+  <p:cSld>
+    <p:spTree>
+      <p:nvGrpSpPr>
+        <p:cNvPr id="1" name=""/>
+        <p:cNvGrpSpPr/>
+        <p:nvPr/>
+      </p:nvGrpSpPr>
+      <p:grpSpPr>
+        <a:xfrm>
+          <a:off x="0" y="0"/>
+          <a:ext cx="0" cy="0"/>
+          <a:chOff x="0" y="0"/>
+          <a:chExt cx="0" cy="0"/>
+        </a:xfrm>
+      </p:grpSpPr>
+      <p:sp>
+        <p:nvSpPr>
+          <p:cNvPr id="2" name="Title 1"/>
+          <p:cNvSpPr>
+            <a:spLocks noGrp="1"/>
+          </p:cNvSpPr>
+          <p:nvPr>
+            <p:ph type="title"/>
+          </p:nvPr>
+        </p:nvSpPr>
+        <p:spPr/>
+        <p:txBody>
+          <a:bodyPr/>
+          <a:lstStyle/>
+          <a:p>
+            <a:r>
+              <a:rPr lang="en-US" dirty="0" smtClean="0"/>
+              <a:t>Example: Motor Velocity</a:t>
+            </a:r>
+            <a:endParaRPr lang="en-US" dirty="0"/>
+          </a:p>
+        </p:txBody>
+      </p:sp>
+      <p:sp>
+        <p:nvSpPr>
+          <p:cNvPr id="3" name="Text Placeholder 2"/>
+          <p:cNvSpPr>
+            <a:spLocks noGrp="1"/>
+          </p:cNvSpPr>
+          <p:nvPr>
+            <p:ph type="body" idx="1"/>
+          </p:nvPr>
+        </p:nvSpPr>
+        <p:spPr/>
+        <p:txBody>
+          <a:bodyPr/>
+          <a:lstStyle/>
+          <a:p>
+            <a:r>
+              <a:rPr lang="en-US" dirty="0" smtClean="0"/>
+              <a:t>5.0</a:t>
+            </a:r>
+            <a:endParaRPr lang="en-US" dirty="0"/>
+          </a:p>
+        </p:txBody>
+      </p:sp>
+      <p:sp>
+        <p:nvSpPr>
+          <p:cNvPr id="4" name="Text Placeholder 3"/>
+          <p:cNvSpPr>
+            <a:spLocks noGrp="1"/>
+          </p:cNvSpPr>
+          <p:nvPr>
+            <p:ph type="body" idx="2"/>
+          </p:nvPr>
+        </p:nvSpPr>
+        <p:spPr/>
+        <p:txBody>
+          <a:bodyPr/>
+          <a:lstStyle/>
+          <a:p>
+            <a:endParaRPr lang="en-US"/>
+          </a:p>
+        </p:txBody>
+      </p:sp>
+      <p:sp>
+        <p:nvSpPr>
+          <p:cNvPr id="5" name="Slide Number Placeholder 4"/>
+          <p:cNvSpPr>
+            <a:spLocks noGrp="1"/>
+          </p:cNvSpPr>
+          <p:nvPr>
+            <p:ph type="sldNum" idx="12"/>
+          </p:nvPr>
+        </p:nvSpPr>
+        <p:spPr/>
+        <p:txBody>
+          <a:bodyPr/>
+          <a:lstStyle/>
+          <a:p>
+            <a:fld id="{00000000-1234-1234-1234-123412341234}" type="slidenum">
+              <a:rPr lang="en" smtClean="0"/>
+              <a:pPr/>
+              <a:t>48</a:t>
+            </a:fld>
+            <a:endParaRPr lang="en"/>
+          </a:p>
+        </p:txBody>
+      </p:sp>
+    </p:spTree>
+    <p:extLst>
+      <p:ext uri="{BB962C8B-B14F-4D97-AF65-F5344CB8AC3E}">
+        <p14:creationId xmlns:p14="http://schemas.microsoft.com/office/powerpoint/2010/main" val="741603320"/>
+      </p:ext>
+    </p:extLst>
+  </p:cSld>
+  <p:clrMapOvr>
+    <a:masterClrMapping/>
+  </p:clrMapOvr>
+</p:sld>
+</file>
+
+<file path=ppt/slides/slide49.xml><?xml version="1.0" encoding="utf-8"?>
+<p:sld xmlns:a="http://schemas.openxmlformats.org/drawingml/2006/main" xmlns:r="http://schemas.openxmlformats.org/officeDocument/2006/relationships" xmlns:p="http://schemas.openxmlformats.org/presentationml/2006/main">
+  <p:cSld>
+    <p:spTree>
+      <p:nvGrpSpPr>
+        <p:cNvPr id="1" name=""/>
+        <p:cNvGrpSpPr/>
+        <p:nvPr/>
+      </p:nvGrpSpPr>
+      <p:grpSpPr>
+        <a:xfrm>
+          <a:off x="0" y="0"/>
+          <a:ext cx="0" cy="0"/>
+          <a:chOff x="0" y="0"/>
+          <a:chExt cx="0" cy="0"/>
+        </a:xfrm>
+      </p:grpSpPr>
+      <p:sp>
+        <p:nvSpPr>
+          <p:cNvPr id="2" name="Title 1"/>
+          <p:cNvSpPr>
+            <a:spLocks noGrp="1"/>
+          </p:cNvSpPr>
+          <p:nvPr>
+            <p:ph type="title"/>
+          </p:nvPr>
+        </p:nvSpPr>
+        <p:spPr/>
+        <p:txBody>
+          <a:bodyPr/>
+          <a:lstStyle/>
+          <a:p>
+            <a:r>
+              <a:rPr lang="en-US" dirty="0" smtClean="0"/>
+              <a:t>Control </a:t>
+            </a:r>
+            <a:endParaRPr lang="en-US" dirty="0"/>
+          </a:p>
+        </p:txBody>
+      </p:sp>
+      <p:sp>
+        <p:nvSpPr>
+          <p:cNvPr id="3" name="Text Placeholder 2"/>
+          <p:cNvSpPr>
+            <a:spLocks noGrp="1"/>
+          </p:cNvSpPr>
+          <p:nvPr>
+            <p:ph type="body" idx="1"/>
+          </p:nvPr>
+        </p:nvSpPr>
+        <p:spPr/>
+        <p:txBody>
+          <a:bodyPr/>
+          <a:lstStyle/>
+          <a:p>
+            <a:endParaRPr lang="en-US"/>
+          </a:p>
+        </p:txBody>
+      </p:sp>
+      <p:sp>
+        <p:nvSpPr>
+          <p:cNvPr id="4" name="Text Placeholder 3"/>
+          <p:cNvSpPr>
+            <a:spLocks noGrp="1"/>
+          </p:cNvSpPr>
+          <p:nvPr>
+            <p:ph type="body" idx="2"/>
+          </p:nvPr>
+        </p:nvSpPr>
+        <p:spPr/>
+        <p:txBody>
+          <a:bodyPr/>
+          <a:lstStyle/>
+          <a:p>
+            <a:endParaRPr lang="en-US"/>
+          </a:p>
+        </p:txBody>
+      </p:sp>
+      <p:sp>
+        <p:nvSpPr>
+          <p:cNvPr id="5" name="Slide Number Placeholder 4"/>
+          <p:cNvSpPr>
+            <a:spLocks noGrp="1"/>
+          </p:cNvSpPr>
+          <p:nvPr>
+            <p:ph type="sldNum" idx="12"/>
+          </p:nvPr>
+        </p:nvSpPr>
+        <p:spPr/>
+        <p:txBody>
+          <a:bodyPr/>
+          <a:lstStyle/>
+          <a:p>
+            <a:fld id="{00000000-1234-1234-1234-123412341234}" type="slidenum">
+              <a:rPr lang="en" smtClean="0"/>
+              <a:pPr/>
+              <a:t>49</a:t>
+            </a:fld>
+            <a:endParaRPr lang="en"/>
+          </a:p>
+        </p:txBody>
+      </p:sp>
+    </p:spTree>
+    <p:extLst>
+      <p:ext uri="{BB962C8B-B14F-4D97-AF65-F5344CB8AC3E}">
+        <p14:creationId xmlns:p14="http://schemas.microsoft.com/office/powerpoint/2010/main" val="441764910"/>
       </p:ext>
     </p:extLst>
   </p:cSld>
@@ -8236,6 +9729,363 @@
     <p:extLst>
       <p:ext uri="{BB962C8B-B14F-4D97-AF65-F5344CB8AC3E}">
         <p14:creationId xmlns:p14="http://schemas.microsoft.com/office/powerpoint/2010/main" val="63470457"/>
+      </p:ext>
+    </p:extLst>
+  </p:cSld>
+  <p:clrMapOvr>
+    <a:masterClrMapping/>
+  </p:clrMapOvr>
+</p:sld>
+</file>
+
+<file path=ppt/slides/slide50.xml><?xml version="1.0" encoding="utf-8"?>
+<p:sld xmlns:a="http://schemas.openxmlformats.org/drawingml/2006/main" xmlns:r="http://schemas.openxmlformats.org/officeDocument/2006/relationships" xmlns:p="http://schemas.openxmlformats.org/presentationml/2006/main">
+  <p:cSld>
+    <p:spTree>
+      <p:nvGrpSpPr>
+        <p:cNvPr id="1" name=""/>
+        <p:cNvGrpSpPr/>
+        <p:nvPr/>
+      </p:nvGrpSpPr>
+      <p:grpSpPr>
+        <a:xfrm>
+          <a:off x="0" y="0"/>
+          <a:ext cx="0" cy="0"/>
+          <a:chOff x="0" y="0"/>
+          <a:chExt cx="0" cy="0"/>
+        </a:xfrm>
+      </p:grpSpPr>
+      <p:sp>
+        <p:nvSpPr>
+          <p:cNvPr id="2" name="Title 1"/>
+          <p:cNvSpPr>
+            <a:spLocks noGrp="1"/>
+          </p:cNvSpPr>
+          <p:nvPr>
+            <p:ph type="title"/>
+          </p:nvPr>
+        </p:nvSpPr>
+        <p:spPr/>
+        <p:txBody>
+          <a:bodyPr/>
+          <a:lstStyle/>
+          <a:p>
+            <a:r>
+              <a:rPr lang="en-US" dirty="0" smtClean="0"/>
+              <a:t>PD Controller </a:t>
+            </a:r>
+            <a:endParaRPr lang="en-US" dirty="0"/>
+          </a:p>
+        </p:txBody>
+      </p:sp>
+      <p:sp>
+        <p:nvSpPr>
+          <p:cNvPr id="3" name="Text Placeholder 2"/>
+          <p:cNvSpPr>
+            <a:spLocks noGrp="1"/>
+          </p:cNvSpPr>
+          <p:nvPr>
+            <p:ph type="body" idx="1"/>
+          </p:nvPr>
+        </p:nvSpPr>
+        <p:spPr/>
+        <p:txBody>
+          <a:bodyPr/>
+          <a:lstStyle/>
+          <a:p>
+            <a:r>
+              <a:rPr lang="en-US" dirty="0" smtClean="0"/>
+              <a:t>6.0</a:t>
+            </a:r>
+            <a:endParaRPr lang="en-US" dirty="0"/>
+          </a:p>
+        </p:txBody>
+      </p:sp>
+      <p:sp>
+        <p:nvSpPr>
+          <p:cNvPr id="4" name="Text Placeholder 3"/>
+          <p:cNvSpPr>
+            <a:spLocks noGrp="1"/>
+          </p:cNvSpPr>
+          <p:nvPr>
+            <p:ph type="body" idx="2"/>
+          </p:nvPr>
+        </p:nvSpPr>
+        <p:spPr/>
+        <p:txBody>
+          <a:bodyPr/>
+          <a:lstStyle/>
+          <a:p>
+            <a:endParaRPr lang="en-US"/>
+          </a:p>
+        </p:txBody>
+      </p:sp>
+      <p:sp>
+        <p:nvSpPr>
+          <p:cNvPr id="5" name="Slide Number Placeholder 4"/>
+          <p:cNvSpPr>
+            <a:spLocks noGrp="1"/>
+          </p:cNvSpPr>
+          <p:nvPr>
+            <p:ph type="sldNum" idx="12"/>
+          </p:nvPr>
+        </p:nvSpPr>
+        <p:spPr/>
+        <p:txBody>
+          <a:bodyPr/>
+          <a:lstStyle/>
+          <a:p>
+            <a:fld id="{00000000-1234-1234-1234-123412341234}" type="slidenum">
+              <a:rPr lang="en" smtClean="0"/>
+              <a:pPr/>
+              <a:t>50</a:t>
+            </a:fld>
+            <a:endParaRPr lang="en"/>
+          </a:p>
+        </p:txBody>
+      </p:sp>
+    </p:spTree>
+    <p:extLst>
+      <p:ext uri="{BB962C8B-B14F-4D97-AF65-F5344CB8AC3E}">
+        <p14:creationId xmlns:p14="http://schemas.microsoft.com/office/powerpoint/2010/main" val="12325674"/>
+      </p:ext>
+    </p:extLst>
+  </p:cSld>
+  <p:clrMapOvr>
+    <a:masterClrMapping/>
+  </p:clrMapOvr>
+</p:sld>
+</file>
+
+<file path=ppt/slides/slide51.xml><?xml version="1.0" encoding="utf-8"?>
+<p:sld xmlns:a="http://schemas.openxmlformats.org/drawingml/2006/main" xmlns:r="http://schemas.openxmlformats.org/officeDocument/2006/relationships" xmlns:p="http://schemas.openxmlformats.org/presentationml/2006/main">
+  <p:cSld>
+    <p:spTree>
+      <p:nvGrpSpPr>
+        <p:cNvPr id="1" name=""/>
+        <p:cNvGrpSpPr/>
+        <p:nvPr/>
+      </p:nvGrpSpPr>
+      <p:grpSpPr>
+        <a:xfrm>
+          <a:off x="0" y="0"/>
+          <a:ext cx="0" cy="0"/>
+          <a:chOff x="0" y="0"/>
+          <a:chExt cx="0" cy="0"/>
+        </a:xfrm>
+      </p:grpSpPr>
+      <p:sp>
+        <p:nvSpPr>
+          <p:cNvPr id="2" name="Title 1"/>
+          <p:cNvSpPr>
+            <a:spLocks noGrp="1"/>
+          </p:cNvSpPr>
+          <p:nvPr>
+            <p:ph type="title"/>
+          </p:nvPr>
+        </p:nvSpPr>
+        <p:spPr/>
+        <p:txBody>
+          <a:bodyPr/>
+          <a:lstStyle/>
+          <a:p>
+            <a:r>
+              <a:rPr lang="en-US" dirty="0" err="1" smtClean="0"/>
+              <a:t>Hapkit</a:t>
+            </a:r>
+            <a:r>
+              <a:rPr lang="en-US" dirty="0" smtClean="0"/>
+              <a:t> sketch</a:t>
+            </a:r>
+            <a:endParaRPr lang="en-US" dirty="0"/>
+          </a:p>
+        </p:txBody>
+      </p:sp>
+      <p:sp>
+        <p:nvSpPr>
+          <p:cNvPr id="3" name="Text Placeholder 2"/>
+          <p:cNvSpPr>
+            <a:spLocks noGrp="1"/>
+          </p:cNvSpPr>
+          <p:nvPr>
+            <p:ph type="body" idx="1"/>
+          </p:nvPr>
+        </p:nvSpPr>
+        <p:spPr/>
+        <p:txBody>
+          <a:bodyPr/>
+          <a:lstStyle/>
+          <a:p>
+            <a:r>
+              <a:rPr lang="en-US" dirty="0" smtClean="0"/>
+              <a:t>7.0</a:t>
+            </a:r>
+            <a:endParaRPr lang="en-US" dirty="0"/>
+          </a:p>
+        </p:txBody>
+      </p:sp>
+      <p:sp>
+        <p:nvSpPr>
+          <p:cNvPr id="4" name="Text Placeholder 3"/>
+          <p:cNvSpPr>
+            <a:spLocks noGrp="1"/>
+          </p:cNvSpPr>
+          <p:nvPr>
+            <p:ph type="body" idx="2"/>
+          </p:nvPr>
+        </p:nvSpPr>
+        <p:spPr/>
+        <p:txBody>
+          <a:bodyPr/>
+          <a:lstStyle/>
+          <a:p>
+            <a:endParaRPr lang="en-US"/>
+          </a:p>
+        </p:txBody>
+      </p:sp>
+      <p:sp>
+        <p:nvSpPr>
+          <p:cNvPr id="5" name="Slide Number Placeholder 4"/>
+          <p:cNvSpPr>
+            <a:spLocks noGrp="1"/>
+          </p:cNvSpPr>
+          <p:nvPr>
+            <p:ph type="sldNum" idx="12"/>
+          </p:nvPr>
+        </p:nvSpPr>
+        <p:spPr/>
+        <p:txBody>
+          <a:bodyPr/>
+          <a:lstStyle/>
+          <a:p>
+            <a:fld id="{00000000-1234-1234-1234-123412341234}" type="slidenum">
+              <a:rPr lang="en" smtClean="0"/>
+              <a:pPr/>
+              <a:t>51</a:t>
+            </a:fld>
+            <a:endParaRPr lang="en"/>
+          </a:p>
+        </p:txBody>
+      </p:sp>
+    </p:spTree>
+    <p:extLst>
+      <p:ext uri="{BB962C8B-B14F-4D97-AF65-F5344CB8AC3E}">
+        <p14:creationId xmlns:p14="http://schemas.microsoft.com/office/powerpoint/2010/main" val="627326719"/>
+      </p:ext>
+    </p:extLst>
+  </p:cSld>
+  <p:clrMapOvr>
+    <a:masterClrMapping/>
+  </p:clrMapOvr>
+</p:sld>
+</file>
+
+<file path=ppt/slides/slide52.xml><?xml version="1.0" encoding="utf-8"?>
+<p:sld xmlns:a="http://schemas.openxmlformats.org/drawingml/2006/main" xmlns:r="http://schemas.openxmlformats.org/officeDocument/2006/relationships" xmlns:p="http://schemas.openxmlformats.org/presentationml/2006/main">
+  <p:cSld>
+    <p:spTree>
+      <p:nvGrpSpPr>
+        <p:cNvPr id="1" name=""/>
+        <p:cNvGrpSpPr/>
+        <p:nvPr/>
+      </p:nvGrpSpPr>
+      <p:grpSpPr>
+        <a:xfrm>
+          <a:off x="0" y="0"/>
+          <a:ext cx="0" cy="0"/>
+          <a:chOff x="0" y="0"/>
+          <a:chExt cx="0" cy="0"/>
+        </a:xfrm>
+      </p:grpSpPr>
+      <p:sp>
+        <p:nvSpPr>
+          <p:cNvPr id="2" name="Title 1"/>
+          <p:cNvSpPr>
+            <a:spLocks noGrp="1"/>
+          </p:cNvSpPr>
+          <p:nvPr>
+            <p:ph type="title"/>
+          </p:nvPr>
+        </p:nvSpPr>
+        <p:spPr/>
+        <p:txBody>
+          <a:bodyPr/>
+          <a:lstStyle/>
+          <a:p>
+            <a:r>
+              <a:rPr lang="en-US" dirty="0" smtClean="0"/>
+              <a:t>3D Printing and Homework</a:t>
+            </a:r>
+            <a:endParaRPr lang="en-US" dirty="0"/>
+          </a:p>
+        </p:txBody>
+      </p:sp>
+      <p:sp>
+        <p:nvSpPr>
+          <p:cNvPr id="3" name="Text Placeholder 2"/>
+          <p:cNvSpPr>
+            <a:spLocks noGrp="1"/>
+          </p:cNvSpPr>
+          <p:nvPr>
+            <p:ph type="body" idx="1"/>
+          </p:nvPr>
+        </p:nvSpPr>
+        <p:spPr/>
+        <p:txBody>
+          <a:bodyPr/>
+          <a:lstStyle/>
+          <a:p>
+            <a:endParaRPr lang="en-US"/>
+          </a:p>
+        </p:txBody>
+      </p:sp>
+      <p:sp>
+        <p:nvSpPr>
+          <p:cNvPr id="4" name="Text Placeholder 3"/>
+          <p:cNvSpPr>
+            <a:spLocks noGrp="1"/>
+          </p:cNvSpPr>
+          <p:nvPr>
+            <p:ph type="body" idx="2"/>
+          </p:nvPr>
+        </p:nvSpPr>
+        <p:spPr/>
+        <p:txBody>
+          <a:bodyPr/>
+          <a:lstStyle/>
+          <a:p>
+            <a:endParaRPr lang="en-US"/>
+          </a:p>
+        </p:txBody>
+      </p:sp>
+      <p:sp>
+        <p:nvSpPr>
+          <p:cNvPr id="5" name="Slide Number Placeholder 4"/>
+          <p:cNvSpPr>
+            <a:spLocks noGrp="1"/>
+          </p:cNvSpPr>
+          <p:nvPr>
+            <p:ph type="sldNum" idx="12"/>
+          </p:nvPr>
+        </p:nvSpPr>
+        <p:spPr/>
+        <p:txBody>
+          <a:bodyPr/>
+          <a:lstStyle/>
+          <a:p>
+            <a:fld id="{00000000-1234-1234-1234-123412341234}" type="slidenum">
+              <a:rPr lang="en" smtClean="0"/>
+              <a:pPr/>
+              <a:t>52</a:t>
+            </a:fld>
+            <a:endParaRPr lang="en"/>
+          </a:p>
+        </p:txBody>
+      </p:sp>
+    </p:spTree>
+    <p:extLst>
+      <p:ext uri="{BB962C8B-B14F-4D97-AF65-F5344CB8AC3E}">
+        <p14:creationId xmlns:p14="http://schemas.microsoft.com/office/powerpoint/2010/main" val="2453752899"/>
       </p:ext>
     </p:extLst>
   </p:cSld>

</xml_diff>